<commit_message>
arduino driver sketch und energiekonvertierung
</commit_message>
<xml_diff>
--- a/Doku/externalFiles/Leistungsflussdiagramm.pptx
+++ b/Doku/externalFiles/Leistungsflussdiagramm.pptx
@@ -2,18 +2,18 @@
 <file path=ppt/presentation.xml><?xml version="1.0" encoding="utf-8"?>
 <p:presentation xmlns:a="http://schemas.openxmlformats.org/drawingml/2006/main" xmlns:r="http://schemas.openxmlformats.org/officeDocument/2006/relationships" xmlns:p="http://schemas.openxmlformats.org/presentationml/2006/main" saveSubsetFonts="1" autoCompressPictures="0">
   <p:sldMasterIdLst>
-    <p:sldMasterId id="2147483648" r:id="rId1"/>
+    <p:sldMasterId id="2147483660" r:id="rId1"/>
   </p:sldMasterIdLst>
   <p:sldIdLst>
     <p:sldId id="256" r:id="rId2"/>
   </p:sldIdLst>
-  <p:sldSz cx="12192000" cy="6858000"/>
+  <p:sldSz cx="12192000" cy="5400675"/>
   <p:notesSz cx="6858000" cy="9144000"/>
   <p:defaultTextStyle>
     <a:defPPr>
-      <a:defRPr lang="de-DE"/>
+      <a:defRPr lang="en-US"/>
     </a:defPPr>
-    <a:lvl1pPr marL="0" algn="l" defTabSz="914400" rtl="0" eaLnBrk="1" latinLnBrk="0" hangingPunct="1">
+    <a:lvl1pPr marL="0" algn="l" defTabSz="457200" rtl="0" eaLnBrk="1" latinLnBrk="0" hangingPunct="1">
       <a:defRPr sz="1800" kern="1200">
         <a:solidFill>
           <a:schemeClr val="tx1"/>
@@ -23,7 +23,7 @@
         <a:cs typeface="+mn-cs"/>
       </a:defRPr>
     </a:lvl1pPr>
-    <a:lvl2pPr marL="457200" algn="l" defTabSz="914400" rtl="0" eaLnBrk="1" latinLnBrk="0" hangingPunct="1">
+    <a:lvl2pPr marL="457200" algn="l" defTabSz="457200" rtl="0" eaLnBrk="1" latinLnBrk="0" hangingPunct="1">
       <a:defRPr sz="1800" kern="1200">
         <a:solidFill>
           <a:schemeClr val="tx1"/>
@@ -33,7 +33,7 @@
         <a:cs typeface="+mn-cs"/>
       </a:defRPr>
     </a:lvl2pPr>
-    <a:lvl3pPr marL="914400" algn="l" defTabSz="914400" rtl="0" eaLnBrk="1" latinLnBrk="0" hangingPunct="1">
+    <a:lvl3pPr marL="914400" algn="l" defTabSz="457200" rtl="0" eaLnBrk="1" latinLnBrk="0" hangingPunct="1">
       <a:defRPr sz="1800" kern="1200">
         <a:solidFill>
           <a:schemeClr val="tx1"/>
@@ -43,7 +43,7 @@
         <a:cs typeface="+mn-cs"/>
       </a:defRPr>
     </a:lvl3pPr>
-    <a:lvl4pPr marL="1371600" algn="l" defTabSz="914400" rtl="0" eaLnBrk="1" latinLnBrk="0" hangingPunct="1">
+    <a:lvl4pPr marL="1371600" algn="l" defTabSz="457200" rtl="0" eaLnBrk="1" latinLnBrk="0" hangingPunct="1">
       <a:defRPr sz="1800" kern="1200">
         <a:solidFill>
           <a:schemeClr val="tx1"/>
@@ -53,7 +53,7 @@
         <a:cs typeface="+mn-cs"/>
       </a:defRPr>
     </a:lvl4pPr>
-    <a:lvl5pPr marL="1828800" algn="l" defTabSz="914400" rtl="0" eaLnBrk="1" latinLnBrk="0" hangingPunct="1">
+    <a:lvl5pPr marL="1828800" algn="l" defTabSz="457200" rtl="0" eaLnBrk="1" latinLnBrk="0" hangingPunct="1">
       <a:defRPr sz="1800" kern="1200">
         <a:solidFill>
           <a:schemeClr val="tx1"/>
@@ -63,7 +63,7 @@
         <a:cs typeface="+mn-cs"/>
       </a:defRPr>
     </a:lvl5pPr>
-    <a:lvl6pPr marL="2286000" algn="l" defTabSz="914400" rtl="0" eaLnBrk="1" latinLnBrk="0" hangingPunct="1">
+    <a:lvl6pPr marL="2286000" algn="l" defTabSz="457200" rtl="0" eaLnBrk="1" latinLnBrk="0" hangingPunct="1">
       <a:defRPr sz="1800" kern="1200">
         <a:solidFill>
           <a:schemeClr val="tx1"/>
@@ -73,7 +73,7 @@
         <a:cs typeface="+mn-cs"/>
       </a:defRPr>
     </a:lvl6pPr>
-    <a:lvl7pPr marL="2743200" algn="l" defTabSz="914400" rtl="0" eaLnBrk="1" latinLnBrk="0" hangingPunct="1">
+    <a:lvl7pPr marL="2743200" algn="l" defTabSz="457200" rtl="0" eaLnBrk="1" latinLnBrk="0" hangingPunct="1">
       <a:defRPr sz="1800" kern="1200">
         <a:solidFill>
           <a:schemeClr val="tx1"/>
@@ -83,7 +83,7 @@
         <a:cs typeface="+mn-cs"/>
       </a:defRPr>
     </a:lvl7pPr>
-    <a:lvl8pPr marL="3200400" algn="l" defTabSz="914400" rtl="0" eaLnBrk="1" latinLnBrk="0" hangingPunct="1">
+    <a:lvl8pPr marL="3200400" algn="l" defTabSz="457200" rtl="0" eaLnBrk="1" latinLnBrk="0" hangingPunct="1">
       <a:defRPr sz="1800" kern="1200">
         <a:solidFill>
           <a:schemeClr val="tx1"/>
@@ -93,7 +93,7 @@
         <a:cs typeface="+mn-cs"/>
       </a:defRPr>
     </a:lvl8pPr>
-    <a:lvl9pPr marL="3657600" algn="l" defTabSz="914400" rtl="0" eaLnBrk="1" latinLnBrk="0" hangingPunct="1">
+    <a:lvl9pPr marL="3657600" algn="l" defTabSz="457200" rtl="0" eaLnBrk="1" latinLnBrk="0" hangingPunct="1">
       <a:defRPr sz="1800" kern="1200">
         <a:solidFill>
           <a:schemeClr val="tx1"/>
@@ -104,6 +104,11 @@
       </a:defRPr>
     </a:lvl9pPr>
   </p:defaultTextStyle>
+  <p:extLst>
+    <p:ext uri="{EFAFB233-063F-42B5-8137-9DF3F51BA10A}">
+      <p15:sldGuideLst xmlns:p15="http://schemas.microsoft.com/office/powerpoint/2012/main"/>
+    </p:ext>
+  </p:extLst>
 </p:presentation>
 </file>
 
@@ -126,13 +131,7 @@
       </p:grpSpPr>
       <p:sp>
         <p:nvSpPr>
-          <p:cNvPr id="2" name="Titel 1">
-            <a:extLst>
-              <a:ext uri="{FF2B5EF4-FFF2-40B4-BE49-F238E27FC236}">
-                <a16:creationId xmlns:a16="http://schemas.microsoft.com/office/drawing/2014/main" id="{9419469D-9235-1F48-AB11-53B0A67D08C6}"/>
-              </a:ext>
-            </a:extLst>
-          </p:cNvPr>
+          <p:cNvPr id="2" name="Title 1"/>
           <p:cNvSpPr>
             <a:spLocks noGrp="1"/>
           </p:cNvSpPr>
@@ -142,15 +141,15 @@
         </p:nvSpPr>
         <p:spPr>
           <a:xfrm>
-            <a:off x="1524000" y="1122363"/>
-            <a:ext cx="9144000" cy="2387600"/>
+            <a:off x="1524000" y="883861"/>
+            <a:ext cx="9144000" cy="1880235"/>
           </a:xfrm>
         </p:spPr>
         <p:txBody>
           <a:bodyPr anchor="b"/>
           <a:lstStyle>
             <a:lvl1pPr algn="ctr">
-              <a:defRPr sz="6000"/>
+              <a:defRPr sz="4725"/>
             </a:lvl1pPr>
           </a:lstStyle>
           <a:p>
@@ -158,18 +157,13 @@
               <a:rPr lang="de-DE"/>
               <a:t>Mastertitelformat bearbeiten</a:t>
             </a:r>
-          </a:p>
-        </p:txBody>
-      </p:sp>
-      <p:sp>
-        <p:nvSpPr>
-          <p:cNvPr id="3" name="Untertitel 2">
-            <a:extLst>
-              <a:ext uri="{FF2B5EF4-FFF2-40B4-BE49-F238E27FC236}">
-                <a16:creationId xmlns:a16="http://schemas.microsoft.com/office/drawing/2014/main" id="{B9D2ADC3-D918-5C40-AACF-E6928B4FF6FB}"/>
-              </a:ext>
-            </a:extLst>
-          </p:cNvPr>
+            <a:endParaRPr lang="en-US" dirty="0"/>
+          </a:p>
+        </p:txBody>
+      </p:sp>
+      <p:sp>
+        <p:nvSpPr>
+          <p:cNvPr id="3" name="Subtitle 2"/>
           <p:cNvSpPr>
             <a:spLocks noGrp="1"/>
           </p:cNvSpPr>
@@ -179,8 +173,8 @@
         </p:nvSpPr>
         <p:spPr>
           <a:xfrm>
-            <a:off x="1524000" y="3602038"/>
-            <a:ext cx="9144000" cy="1655762"/>
+            <a:off x="1524000" y="2836605"/>
+            <a:ext cx="9144000" cy="1303913"/>
           </a:xfrm>
         </p:spPr>
         <p:txBody>
@@ -188,39 +182,39 @@
           <a:lstStyle>
             <a:lvl1pPr marL="0" indent="0" algn="ctr">
               <a:buNone/>
-              <a:defRPr sz="2400"/>
+              <a:defRPr sz="1890"/>
             </a:lvl1pPr>
-            <a:lvl2pPr marL="457200" indent="0" algn="ctr">
-              <a:buNone/>
-              <a:defRPr sz="2000"/>
+            <a:lvl2pPr marL="360045" indent="0" algn="ctr">
+              <a:buNone/>
+              <a:defRPr sz="1575"/>
             </a:lvl2pPr>
-            <a:lvl3pPr marL="914400" indent="0" algn="ctr">
-              <a:buNone/>
-              <a:defRPr sz="1800"/>
+            <a:lvl3pPr marL="720090" indent="0" algn="ctr">
+              <a:buNone/>
+              <a:defRPr sz="1418"/>
             </a:lvl3pPr>
-            <a:lvl4pPr marL="1371600" indent="0" algn="ctr">
-              <a:buNone/>
-              <a:defRPr sz="1600"/>
+            <a:lvl4pPr marL="1080135" indent="0" algn="ctr">
+              <a:buNone/>
+              <a:defRPr sz="1260"/>
             </a:lvl4pPr>
-            <a:lvl5pPr marL="1828800" indent="0" algn="ctr">
-              <a:buNone/>
-              <a:defRPr sz="1600"/>
+            <a:lvl5pPr marL="1440180" indent="0" algn="ctr">
+              <a:buNone/>
+              <a:defRPr sz="1260"/>
             </a:lvl5pPr>
-            <a:lvl6pPr marL="2286000" indent="0" algn="ctr">
-              <a:buNone/>
-              <a:defRPr sz="1600"/>
+            <a:lvl6pPr marL="1800225" indent="0" algn="ctr">
+              <a:buNone/>
+              <a:defRPr sz="1260"/>
             </a:lvl6pPr>
-            <a:lvl7pPr marL="2743200" indent="0" algn="ctr">
-              <a:buNone/>
-              <a:defRPr sz="1600"/>
+            <a:lvl7pPr marL="2160270" indent="0" algn="ctr">
+              <a:buNone/>
+              <a:defRPr sz="1260"/>
             </a:lvl7pPr>
-            <a:lvl8pPr marL="3200400" indent="0" algn="ctr">
-              <a:buNone/>
-              <a:defRPr sz="1600"/>
+            <a:lvl8pPr marL="2520315" indent="0" algn="ctr">
+              <a:buNone/>
+              <a:defRPr sz="1260"/>
             </a:lvl8pPr>
-            <a:lvl9pPr marL="3657600" indent="0" algn="ctr">
-              <a:buNone/>
-              <a:defRPr sz="1600"/>
+            <a:lvl9pPr marL="2880360" indent="0" algn="ctr">
+              <a:buNone/>
+              <a:defRPr sz="1260"/>
             </a:lvl9pPr>
           </a:lstStyle>
           <a:p>
@@ -228,18 +222,13 @@
               <a:rPr lang="de-DE"/>
               <a:t>Master-Untertitelformat bearbeiten</a:t>
             </a:r>
-          </a:p>
-        </p:txBody>
-      </p:sp>
-      <p:sp>
-        <p:nvSpPr>
-          <p:cNvPr id="4" name="Datumsplatzhalter 3">
-            <a:extLst>
-              <a:ext uri="{FF2B5EF4-FFF2-40B4-BE49-F238E27FC236}">
-                <a16:creationId xmlns:a16="http://schemas.microsoft.com/office/drawing/2014/main" id="{4BF22C91-9F71-C943-B0CD-11942265B5BB}"/>
-              </a:ext>
-            </a:extLst>
-          </p:cNvPr>
+            <a:endParaRPr lang="en-US" dirty="0"/>
+          </a:p>
+        </p:txBody>
+      </p:sp>
+      <p:sp>
+        <p:nvSpPr>
+          <p:cNvPr id="4" name="Date Placeholder 3"/>
           <p:cNvSpPr>
             <a:spLocks noGrp="1"/>
           </p:cNvSpPr>
@@ -254,7 +243,7 @@
           <a:p>
             <a:fld id="{1707C51D-322A-654B-9655-3C83443E7C31}" type="datetimeFigureOut">
               <a:rPr lang="de-DE" smtClean="0"/>
-              <a:t>14.11.21</a:t>
+              <a:t>08.12.21</a:t>
             </a:fld>
             <a:endParaRPr lang="de-DE"/>
           </a:p>
@@ -262,13 +251,7 @@
       </p:sp>
       <p:sp>
         <p:nvSpPr>
-          <p:cNvPr id="5" name="Fußzeilenplatzhalter 4">
-            <a:extLst>
-              <a:ext uri="{FF2B5EF4-FFF2-40B4-BE49-F238E27FC236}">
-                <a16:creationId xmlns:a16="http://schemas.microsoft.com/office/drawing/2014/main" id="{9472712A-6C26-9243-B6C1-E4810B0109B0}"/>
-              </a:ext>
-            </a:extLst>
-          </p:cNvPr>
+          <p:cNvPr id="5" name="Footer Placeholder 4"/>
           <p:cNvSpPr>
             <a:spLocks noGrp="1"/>
           </p:cNvSpPr>
@@ -287,13 +270,7 @@
       </p:sp>
       <p:sp>
         <p:nvSpPr>
-          <p:cNvPr id="6" name="Foliennummernplatzhalter 5">
-            <a:extLst>
-              <a:ext uri="{FF2B5EF4-FFF2-40B4-BE49-F238E27FC236}">
-                <a16:creationId xmlns:a16="http://schemas.microsoft.com/office/drawing/2014/main" id="{B0F59D6E-0FFD-7546-A512-D25DA4AACBC8}"/>
-              </a:ext>
-            </a:extLst>
-          </p:cNvPr>
+          <p:cNvPr id="6" name="Slide Number Placeholder 5"/>
           <p:cNvSpPr>
             <a:spLocks noGrp="1"/>
           </p:cNvSpPr>
@@ -317,7 +294,7 @@
     </p:spTree>
     <p:extLst>
       <p:ext uri="{BB962C8B-B14F-4D97-AF65-F5344CB8AC3E}">
-        <p14:creationId xmlns:p14="http://schemas.microsoft.com/office/powerpoint/2010/main" val="601460149"/>
+        <p14:creationId xmlns:p14="http://schemas.microsoft.com/office/powerpoint/2010/main" val="3763968090"/>
       </p:ext>
     </p:extLst>
   </p:cSld>
@@ -346,13 +323,7 @@
       </p:grpSpPr>
       <p:sp>
         <p:nvSpPr>
-          <p:cNvPr id="2" name="Titel 1">
-            <a:extLst>
-              <a:ext uri="{FF2B5EF4-FFF2-40B4-BE49-F238E27FC236}">
-                <a16:creationId xmlns:a16="http://schemas.microsoft.com/office/drawing/2014/main" id="{8ED18A81-9610-664A-A304-A9901A3C6F1A}"/>
-              </a:ext>
-            </a:extLst>
-          </p:cNvPr>
+          <p:cNvPr id="2" name="Title 1"/>
           <p:cNvSpPr>
             <a:spLocks noGrp="1"/>
           </p:cNvSpPr>
@@ -369,18 +340,13 @@
               <a:rPr lang="de-DE"/>
               <a:t>Mastertitelformat bearbeiten</a:t>
             </a:r>
-          </a:p>
-        </p:txBody>
-      </p:sp>
-      <p:sp>
-        <p:nvSpPr>
-          <p:cNvPr id="3" name="Vertikaler Textplatzhalter 2">
-            <a:extLst>
-              <a:ext uri="{FF2B5EF4-FFF2-40B4-BE49-F238E27FC236}">
-                <a16:creationId xmlns:a16="http://schemas.microsoft.com/office/drawing/2014/main" id="{659ED1FF-A8B8-E24C-9ECD-5CC13BBF3B30}"/>
-              </a:ext>
-            </a:extLst>
-          </p:cNvPr>
+            <a:endParaRPr lang="en-US" dirty="0"/>
+          </a:p>
+        </p:txBody>
+      </p:sp>
+      <p:sp>
+        <p:nvSpPr>
+          <p:cNvPr id="3" name="Vertical Text Placeholder 2"/>
           <p:cNvSpPr>
             <a:spLocks noGrp="1"/>
           </p:cNvSpPr>
@@ -426,18 +392,13 @@
               <a:rPr lang="de-DE"/>
               <a:t>Fünfte Ebene</a:t>
             </a:r>
-          </a:p>
-        </p:txBody>
-      </p:sp>
-      <p:sp>
-        <p:nvSpPr>
-          <p:cNvPr id="4" name="Datumsplatzhalter 3">
-            <a:extLst>
-              <a:ext uri="{FF2B5EF4-FFF2-40B4-BE49-F238E27FC236}">
-                <a16:creationId xmlns:a16="http://schemas.microsoft.com/office/drawing/2014/main" id="{E21A5CA3-1701-9141-BDE0-04B1CDF7CFD3}"/>
-              </a:ext>
-            </a:extLst>
-          </p:cNvPr>
+            <a:endParaRPr lang="en-US" dirty="0"/>
+          </a:p>
+        </p:txBody>
+      </p:sp>
+      <p:sp>
+        <p:nvSpPr>
+          <p:cNvPr id="4" name="Date Placeholder 3"/>
           <p:cNvSpPr>
             <a:spLocks noGrp="1"/>
           </p:cNvSpPr>
@@ -452,7 +413,7 @@
           <a:p>
             <a:fld id="{1707C51D-322A-654B-9655-3C83443E7C31}" type="datetimeFigureOut">
               <a:rPr lang="de-DE" smtClean="0"/>
-              <a:t>14.11.21</a:t>
+              <a:t>08.12.21</a:t>
             </a:fld>
             <a:endParaRPr lang="de-DE"/>
           </a:p>
@@ -460,13 +421,7 @@
       </p:sp>
       <p:sp>
         <p:nvSpPr>
-          <p:cNvPr id="5" name="Fußzeilenplatzhalter 4">
-            <a:extLst>
-              <a:ext uri="{FF2B5EF4-FFF2-40B4-BE49-F238E27FC236}">
-                <a16:creationId xmlns:a16="http://schemas.microsoft.com/office/drawing/2014/main" id="{9DD22F3B-1668-E848-A8C7-CFE2CBE8B068}"/>
-              </a:ext>
-            </a:extLst>
-          </p:cNvPr>
+          <p:cNvPr id="5" name="Footer Placeholder 4"/>
           <p:cNvSpPr>
             <a:spLocks noGrp="1"/>
           </p:cNvSpPr>
@@ -485,13 +440,7 @@
       </p:sp>
       <p:sp>
         <p:nvSpPr>
-          <p:cNvPr id="6" name="Foliennummernplatzhalter 5">
-            <a:extLst>
-              <a:ext uri="{FF2B5EF4-FFF2-40B4-BE49-F238E27FC236}">
-                <a16:creationId xmlns:a16="http://schemas.microsoft.com/office/drawing/2014/main" id="{C4DEB4BF-557E-664D-8879-59E0F0F1E946}"/>
-              </a:ext>
-            </a:extLst>
-          </p:cNvPr>
+          <p:cNvPr id="6" name="Slide Number Placeholder 5"/>
           <p:cNvSpPr>
             <a:spLocks noGrp="1"/>
           </p:cNvSpPr>
@@ -515,7 +464,7 @@
     </p:spTree>
     <p:extLst>
       <p:ext uri="{BB962C8B-B14F-4D97-AF65-F5344CB8AC3E}">
-        <p14:creationId xmlns:p14="http://schemas.microsoft.com/office/powerpoint/2010/main" val="951862958"/>
+        <p14:creationId xmlns:p14="http://schemas.microsoft.com/office/powerpoint/2010/main" val="3623890712"/>
       </p:ext>
     </p:extLst>
   </p:cSld>
@@ -544,13 +493,7 @@
       </p:grpSpPr>
       <p:sp>
         <p:nvSpPr>
-          <p:cNvPr id="2" name="Vertikaler Titel 1">
-            <a:extLst>
-              <a:ext uri="{FF2B5EF4-FFF2-40B4-BE49-F238E27FC236}">
-                <a16:creationId xmlns:a16="http://schemas.microsoft.com/office/drawing/2014/main" id="{2A360F04-41E2-FE43-876C-A09B98B86974}"/>
-              </a:ext>
-            </a:extLst>
-          </p:cNvPr>
+          <p:cNvPr id="2" name="Vertical Title 1"/>
           <p:cNvSpPr>
             <a:spLocks noGrp="1"/>
           </p:cNvSpPr>
@@ -560,8 +503,8 @@
         </p:nvSpPr>
         <p:spPr>
           <a:xfrm>
-            <a:off x="8724900" y="365125"/>
-            <a:ext cx="2628900" cy="5811838"/>
+            <a:off x="8724900" y="287536"/>
+            <a:ext cx="2628900" cy="4576822"/>
           </a:xfrm>
         </p:spPr>
         <p:txBody>
@@ -572,18 +515,13 @@
               <a:rPr lang="de-DE"/>
               <a:t>Mastertitelformat bearbeiten</a:t>
             </a:r>
-          </a:p>
-        </p:txBody>
-      </p:sp>
-      <p:sp>
-        <p:nvSpPr>
-          <p:cNvPr id="3" name="Vertikaler Textplatzhalter 2">
-            <a:extLst>
-              <a:ext uri="{FF2B5EF4-FFF2-40B4-BE49-F238E27FC236}">
-                <a16:creationId xmlns:a16="http://schemas.microsoft.com/office/drawing/2014/main" id="{D4FD3894-6519-684E-8D36-96282F1BB8FB}"/>
-              </a:ext>
-            </a:extLst>
-          </p:cNvPr>
+            <a:endParaRPr lang="en-US" dirty="0"/>
+          </a:p>
+        </p:txBody>
+      </p:sp>
+      <p:sp>
+        <p:nvSpPr>
+          <p:cNvPr id="3" name="Vertical Text Placeholder 2"/>
           <p:cNvSpPr>
             <a:spLocks noGrp="1"/>
           </p:cNvSpPr>
@@ -593,8 +531,8 @@
         </p:nvSpPr>
         <p:spPr>
           <a:xfrm>
-            <a:off x="838200" y="365125"/>
-            <a:ext cx="7734300" cy="5811838"/>
+            <a:off x="838200" y="287536"/>
+            <a:ext cx="7734300" cy="4576822"/>
           </a:xfrm>
         </p:spPr>
         <p:txBody>
@@ -634,18 +572,13 @@
               <a:rPr lang="de-DE"/>
               <a:t>Fünfte Ebene</a:t>
             </a:r>
-          </a:p>
-        </p:txBody>
-      </p:sp>
-      <p:sp>
-        <p:nvSpPr>
-          <p:cNvPr id="4" name="Datumsplatzhalter 3">
-            <a:extLst>
-              <a:ext uri="{FF2B5EF4-FFF2-40B4-BE49-F238E27FC236}">
-                <a16:creationId xmlns:a16="http://schemas.microsoft.com/office/drawing/2014/main" id="{C3E0DD70-CD36-524A-8AAC-E9A85FD0B620}"/>
-              </a:ext>
-            </a:extLst>
-          </p:cNvPr>
+            <a:endParaRPr lang="en-US" dirty="0"/>
+          </a:p>
+        </p:txBody>
+      </p:sp>
+      <p:sp>
+        <p:nvSpPr>
+          <p:cNvPr id="4" name="Date Placeholder 3"/>
           <p:cNvSpPr>
             <a:spLocks noGrp="1"/>
           </p:cNvSpPr>
@@ -660,7 +593,7 @@
           <a:p>
             <a:fld id="{1707C51D-322A-654B-9655-3C83443E7C31}" type="datetimeFigureOut">
               <a:rPr lang="de-DE" smtClean="0"/>
-              <a:t>14.11.21</a:t>
+              <a:t>08.12.21</a:t>
             </a:fld>
             <a:endParaRPr lang="de-DE"/>
           </a:p>
@@ -668,13 +601,7 @@
       </p:sp>
       <p:sp>
         <p:nvSpPr>
-          <p:cNvPr id="5" name="Fußzeilenplatzhalter 4">
-            <a:extLst>
-              <a:ext uri="{FF2B5EF4-FFF2-40B4-BE49-F238E27FC236}">
-                <a16:creationId xmlns:a16="http://schemas.microsoft.com/office/drawing/2014/main" id="{0632C5F9-72A0-5D48-88DB-DA6D51C9814D}"/>
-              </a:ext>
-            </a:extLst>
-          </p:cNvPr>
+          <p:cNvPr id="5" name="Footer Placeholder 4"/>
           <p:cNvSpPr>
             <a:spLocks noGrp="1"/>
           </p:cNvSpPr>
@@ -693,13 +620,7 @@
       </p:sp>
       <p:sp>
         <p:nvSpPr>
-          <p:cNvPr id="6" name="Foliennummernplatzhalter 5">
-            <a:extLst>
-              <a:ext uri="{FF2B5EF4-FFF2-40B4-BE49-F238E27FC236}">
-                <a16:creationId xmlns:a16="http://schemas.microsoft.com/office/drawing/2014/main" id="{BBECC920-CFA1-7244-8C15-57254AE9C720}"/>
-              </a:ext>
-            </a:extLst>
-          </p:cNvPr>
+          <p:cNvPr id="6" name="Slide Number Placeholder 5"/>
           <p:cNvSpPr>
             <a:spLocks noGrp="1"/>
           </p:cNvSpPr>
@@ -723,7 +644,7 @@
     </p:spTree>
     <p:extLst>
       <p:ext uri="{BB962C8B-B14F-4D97-AF65-F5344CB8AC3E}">
-        <p14:creationId xmlns:p14="http://schemas.microsoft.com/office/powerpoint/2010/main" val="2542023848"/>
+        <p14:creationId xmlns:p14="http://schemas.microsoft.com/office/powerpoint/2010/main" val="377839303"/>
       </p:ext>
     </p:extLst>
   </p:cSld>
@@ -752,13 +673,7 @@
       </p:grpSpPr>
       <p:sp>
         <p:nvSpPr>
-          <p:cNvPr id="2" name="Titel 1">
-            <a:extLst>
-              <a:ext uri="{FF2B5EF4-FFF2-40B4-BE49-F238E27FC236}">
-                <a16:creationId xmlns:a16="http://schemas.microsoft.com/office/drawing/2014/main" id="{927EE518-17BB-FD45-A5EB-0670CD93931D}"/>
-              </a:ext>
-            </a:extLst>
-          </p:cNvPr>
+          <p:cNvPr id="2" name="Title 1"/>
           <p:cNvSpPr>
             <a:spLocks noGrp="1"/>
           </p:cNvSpPr>
@@ -775,18 +690,13 @@
               <a:rPr lang="de-DE"/>
               <a:t>Mastertitelformat bearbeiten</a:t>
             </a:r>
-          </a:p>
-        </p:txBody>
-      </p:sp>
-      <p:sp>
-        <p:nvSpPr>
-          <p:cNvPr id="3" name="Inhaltsplatzhalter 2">
-            <a:extLst>
-              <a:ext uri="{FF2B5EF4-FFF2-40B4-BE49-F238E27FC236}">
-                <a16:creationId xmlns:a16="http://schemas.microsoft.com/office/drawing/2014/main" id="{2E706665-178A-584B-8289-25418B97E1E8}"/>
-              </a:ext>
-            </a:extLst>
-          </p:cNvPr>
+            <a:endParaRPr lang="en-US" dirty="0"/>
+          </a:p>
+        </p:txBody>
+      </p:sp>
+      <p:sp>
+        <p:nvSpPr>
+          <p:cNvPr id="3" name="Content Placeholder 2"/>
           <p:cNvSpPr>
             <a:spLocks noGrp="1"/>
           </p:cNvSpPr>
@@ -832,18 +742,13 @@
               <a:rPr lang="de-DE"/>
               <a:t>Fünfte Ebene</a:t>
             </a:r>
-          </a:p>
-        </p:txBody>
-      </p:sp>
-      <p:sp>
-        <p:nvSpPr>
-          <p:cNvPr id="4" name="Datumsplatzhalter 3">
-            <a:extLst>
-              <a:ext uri="{FF2B5EF4-FFF2-40B4-BE49-F238E27FC236}">
-                <a16:creationId xmlns:a16="http://schemas.microsoft.com/office/drawing/2014/main" id="{E806634E-67E6-694E-B90A-BA7D6660D9AE}"/>
-              </a:ext>
-            </a:extLst>
-          </p:cNvPr>
+            <a:endParaRPr lang="en-US" dirty="0"/>
+          </a:p>
+        </p:txBody>
+      </p:sp>
+      <p:sp>
+        <p:nvSpPr>
+          <p:cNvPr id="4" name="Date Placeholder 3"/>
           <p:cNvSpPr>
             <a:spLocks noGrp="1"/>
           </p:cNvSpPr>
@@ -858,7 +763,7 @@
           <a:p>
             <a:fld id="{1707C51D-322A-654B-9655-3C83443E7C31}" type="datetimeFigureOut">
               <a:rPr lang="de-DE" smtClean="0"/>
-              <a:t>14.11.21</a:t>
+              <a:t>08.12.21</a:t>
             </a:fld>
             <a:endParaRPr lang="de-DE"/>
           </a:p>
@@ -866,13 +771,7 @@
       </p:sp>
       <p:sp>
         <p:nvSpPr>
-          <p:cNvPr id="5" name="Fußzeilenplatzhalter 4">
-            <a:extLst>
-              <a:ext uri="{FF2B5EF4-FFF2-40B4-BE49-F238E27FC236}">
-                <a16:creationId xmlns:a16="http://schemas.microsoft.com/office/drawing/2014/main" id="{90E9A843-8A2E-4A4B-AF00-59008680A5E6}"/>
-              </a:ext>
-            </a:extLst>
-          </p:cNvPr>
+          <p:cNvPr id="5" name="Footer Placeholder 4"/>
           <p:cNvSpPr>
             <a:spLocks noGrp="1"/>
           </p:cNvSpPr>
@@ -891,13 +790,7 @@
       </p:sp>
       <p:sp>
         <p:nvSpPr>
-          <p:cNvPr id="6" name="Foliennummernplatzhalter 5">
-            <a:extLst>
-              <a:ext uri="{FF2B5EF4-FFF2-40B4-BE49-F238E27FC236}">
-                <a16:creationId xmlns:a16="http://schemas.microsoft.com/office/drawing/2014/main" id="{29C7B70C-46AE-3949-82E7-04845B2364AA}"/>
-              </a:ext>
-            </a:extLst>
-          </p:cNvPr>
+          <p:cNvPr id="6" name="Slide Number Placeholder 5"/>
           <p:cNvSpPr>
             <a:spLocks noGrp="1"/>
           </p:cNvSpPr>
@@ -921,7 +814,7 @@
     </p:spTree>
     <p:extLst>
       <p:ext uri="{BB962C8B-B14F-4D97-AF65-F5344CB8AC3E}">
-        <p14:creationId xmlns:p14="http://schemas.microsoft.com/office/powerpoint/2010/main" val="3219514740"/>
+        <p14:creationId xmlns:p14="http://schemas.microsoft.com/office/powerpoint/2010/main" val="2414499529"/>
       </p:ext>
     </p:extLst>
   </p:cSld>
@@ -950,13 +843,7 @@
       </p:grpSpPr>
       <p:sp>
         <p:nvSpPr>
-          <p:cNvPr id="2" name="Titel 1">
-            <a:extLst>
-              <a:ext uri="{FF2B5EF4-FFF2-40B4-BE49-F238E27FC236}">
-                <a16:creationId xmlns:a16="http://schemas.microsoft.com/office/drawing/2014/main" id="{62CC3475-FD8E-5E46-87F2-9F08758F7449}"/>
-              </a:ext>
-            </a:extLst>
-          </p:cNvPr>
+          <p:cNvPr id="2" name="Title 1"/>
           <p:cNvSpPr>
             <a:spLocks noGrp="1"/>
           </p:cNvSpPr>
@@ -966,15 +853,15 @@
         </p:nvSpPr>
         <p:spPr>
           <a:xfrm>
-            <a:off x="831850" y="1709738"/>
-            <a:ext cx="10515600" cy="2852737"/>
+            <a:off x="831850" y="1346419"/>
+            <a:ext cx="10515600" cy="2246530"/>
           </a:xfrm>
         </p:spPr>
         <p:txBody>
           <a:bodyPr anchor="b"/>
           <a:lstStyle>
             <a:lvl1pPr>
-              <a:defRPr sz="6000"/>
+              <a:defRPr sz="4725"/>
             </a:lvl1pPr>
           </a:lstStyle>
           <a:p>
@@ -982,18 +869,13 @@
               <a:rPr lang="de-DE"/>
               <a:t>Mastertitelformat bearbeiten</a:t>
             </a:r>
-          </a:p>
-        </p:txBody>
-      </p:sp>
-      <p:sp>
-        <p:nvSpPr>
-          <p:cNvPr id="3" name="Textplatzhalter 2">
-            <a:extLst>
-              <a:ext uri="{FF2B5EF4-FFF2-40B4-BE49-F238E27FC236}">
-                <a16:creationId xmlns:a16="http://schemas.microsoft.com/office/drawing/2014/main" id="{11570B5E-BF33-084C-BCF9-CD73A35A612C}"/>
-              </a:ext>
-            </a:extLst>
-          </p:cNvPr>
+            <a:endParaRPr lang="en-US" dirty="0"/>
+          </a:p>
+        </p:txBody>
+      </p:sp>
+      <p:sp>
+        <p:nvSpPr>
+          <p:cNvPr id="3" name="Text Placeholder 2"/>
           <p:cNvSpPr>
             <a:spLocks noGrp="1"/>
           </p:cNvSpPr>
@@ -1003,8 +885,8 @@
         </p:nvSpPr>
         <p:spPr>
           <a:xfrm>
-            <a:off x="831850" y="4589463"/>
-            <a:ext cx="10515600" cy="1500187"/>
+            <a:off x="831850" y="3614203"/>
+            <a:ext cx="10515600" cy="1181397"/>
           </a:xfrm>
         </p:spPr>
         <p:txBody>
@@ -1012,7 +894,7 @@
           <a:lstStyle>
             <a:lvl1pPr marL="0" indent="0">
               <a:buNone/>
-              <a:defRPr sz="2400">
+              <a:defRPr sz="1890">
                 <a:solidFill>
                   <a:schemeClr val="tx1">
                     <a:tint val="75000"/>
@@ -1020,9 +902,9 @@
                 </a:solidFill>
               </a:defRPr>
             </a:lvl1pPr>
-            <a:lvl2pPr marL="457200" indent="0">
-              <a:buNone/>
-              <a:defRPr sz="2000">
+            <a:lvl2pPr marL="360045" indent="0">
+              <a:buNone/>
+              <a:defRPr sz="1575">
                 <a:solidFill>
                   <a:schemeClr val="tx1">
                     <a:tint val="75000"/>
@@ -1030,9 +912,9 @@
                 </a:solidFill>
               </a:defRPr>
             </a:lvl2pPr>
-            <a:lvl3pPr marL="914400" indent="0">
-              <a:buNone/>
-              <a:defRPr sz="1800">
+            <a:lvl3pPr marL="720090" indent="0">
+              <a:buNone/>
+              <a:defRPr sz="1418">
                 <a:solidFill>
                   <a:schemeClr val="tx1">
                     <a:tint val="75000"/>
@@ -1040,9 +922,9 @@
                 </a:solidFill>
               </a:defRPr>
             </a:lvl3pPr>
-            <a:lvl4pPr marL="1371600" indent="0">
-              <a:buNone/>
-              <a:defRPr sz="1600">
+            <a:lvl4pPr marL="1080135" indent="0">
+              <a:buNone/>
+              <a:defRPr sz="1260">
                 <a:solidFill>
                   <a:schemeClr val="tx1">
                     <a:tint val="75000"/>
@@ -1050,9 +932,9 @@
                 </a:solidFill>
               </a:defRPr>
             </a:lvl4pPr>
-            <a:lvl5pPr marL="1828800" indent="0">
-              <a:buNone/>
-              <a:defRPr sz="1600">
+            <a:lvl5pPr marL="1440180" indent="0">
+              <a:buNone/>
+              <a:defRPr sz="1260">
                 <a:solidFill>
                   <a:schemeClr val="tx1">
                     <a:tint val="75000"/>
@@ -1060,9 +942,9 @@
                 </a:solidFill>
               </a:defRPr>
             </a:lvl5pPr>
-            <a:lvl6pPr marL="2286000" indent="0">
-              <a:buNone/>
-              <a:defRPr sz="1600">
+            <a:lvl6pPr marL="1800225" indent="0">
+              <a:buNone/>
+              <a:defRPr sz="1260">
                 <a:solidFill>
                   <a:schemeClr val="tx1">
                     <a:tint val="75000"/>
@@ -1070,9 +952,9 @@
                 </a:solidFill>
               </a:defRPr>
             </a:lvl6pPr>
-            <a:lvl7pPr marL="2743200" indent="0">
-              <a:buNone/>
-              <a:defRPr sz="1600">
+            <a:lvl7pPr marL="2160270" indent="0">
+              <a:buNone/>
+              <a:defRPr sz="1260">
                 <a:solidFill>
                   <a:schemeClr val="tx1">
                     <a:tint val="75000"/>
@@ -1080,9 +962,9 @@
                 </a:solidFill>
               </a:defRPr>
             </a:lvl7pPr>
-            <a:lvl8pPr marL="3200400" indent="0">
-              <a:buNone/>
-              <a:defRPr sz="1600">
+            <a:lvl8pPr marL="2520315" indent="0">
+              <a:buNone/>
+              <a:defRPr sz="1260">
                 <a:solidFill>
                   <a:schemeClr val="tx1">
                     <a:tint val="75000"/>
@@ -1090,9 +972,9 @@
                 </a:solidFill>
               </a:defRPr>
             </a:lvl8pPr>
-            <a:lvl9pPr marL="3657600" indent="0">
-              <a:buNone/>
-              <a:defRPr sz="1600">
+            <a:lvl9pPr marL="2880360" indent="0">
+              <a:buNone/>
+              <a:defRPr sz="1260">
                 <a:solidFill>
                   <a:schemeClr val="tx1">
                     <a:tint val="75000"/>
@@ -1112,13 +994,7 @@
       </p:sp>
       <p:sp>
         <p:nvSpPr>
-          <p:cNvPr id="4" name="Datumsplatzhalter 3">
-            <a:extLst>
-              <a:ext uri="{FF2B5EF4-FFF2-40B4-BE49-F238E27FC236}">
-                <a16:creationId xmlns:a16="http://schemas.microsoft.com/office/drawing/2014/main" id="{D99291E0-B4AC-3F45-9DB1-6B2955C88E47}"/>
-              </a:ext>
-            </a:extLst>
-          </p:cNvPr>
+          <p:cNvPr id="4" name="Date Placeholder 3"/>
           <p:cNvSpPr>
             <a:spLocks noGrp="1"/>
           </p:cNvSpPr>
@@ -1133,7 +1009,7 @@
           <a:p>
             <a:fld id="{1707C51D-322A-654B-9655-3C83443E7C31}" type="datetimeFigureOut">
               <a:rPr lang="de-DE" smtClean="0"/>
-              <a:t>14.11.21</a:t>
+              <a:t>08.12.21</a:t>
             </a:fld>
             <a:endParaRPr lang="de-DE"/>
           </a:p>
@@ -1141,13 +1017,7 @@
       </p:sp>
       <p:sp>
         <p:nvSpPr>
-          <p:cNvPr id="5" name="Fußzeilenplatzhalter 4">
-            <a:extLst>
-              <a:ext uri="{FF2B5EF4-FFF2-40B4-BE49-F238E27FC236}">
-                <a16:creationId xmlns:a16="http://schemas.microsoft.com/office/drawing/2014/main" id="{8574E621-E196-494E-8FBD-47C232051623}"/>
-              </a:ext>
-            </a:extLst>
-          </p:cNvPr>
+          <p:cNvPr id="5" name="Footer Placeholder 4"/>
           <p:cNvSpPr>
             <a:spLocks noGrp="1"/>
           </p:cNvSpPr>
@@ -1166,13 +1036,7 @@
       </p:sp>
       <p:sp>
         <p:nvSpPr>
-          <p:cNvPr id="6" name="Foliennummernplatzhalter 5">
-            <a:extLst>
-              <a:ext uri="{FF2B5EF4-FFF2-40B4-BE49-F238E27FC236}">
-                <a16:creationId xmlns:a16="http://schemas.microsoft.com/office/drawing/2014/main" id="{98DECC44-07F9-BD46-A8A5-E8D790AB86E6}"/>
-              </a:ext>
-            </a:extLst>
-          </p:cNvPr>
+          <p:cNvPr id="6" name="Slide Number Placeholder 5"/>
           <p:cNvSpPr>
             <a:spLocks noGrp="1"/>
           </p:cNvSpPr>
@@ -1196,7 +1060,7 @@
     </p:spTree>
     <p:extLst>
       <p:ext uri="{BB962C8B-B14F-4D97-AF65-F5344CB8AC3E}">
-        <p14:creationId xmlns:p14="http://schemas.microsoft.com/office/powerpoint/2010/main" val="2360198670"/>
+        <p14:creationId xmlns:p14="http://schemas.microsoft.com/office/powerpoint/2010/main" val="2413566934"/>
       </p:ext>
     </p:extLst>
   </p:cSld>
@@ -1225,13 +1089,7 @@
       </p:grpSpPr>
       <p:sp>
         <p:nvSpPr>
-          <p:cNvPr id="2" name="Titel 1">
-            <a:extLst>
-              <a:ext uri="{FF2B5EF4-FFF2-40B4-BE49-F238E27FC236}">
-                <a16:creationId xmlns:a16="http://schemas.microsoft.com/office/drawing/2014/main" id="{8EDD7373-DEE6-E746-851B-735B857A9CFB}"/>
-              </a:ext>
-            </a:extLst>
-          </p:cNvPr>
+          <p:cNvPr id="2" name="Title 1"/>
           <p:cNvSpPr>
             <a:spLocks noGrp="1"/>
           </p:cNvSpPr>
@@ -1248,18 +1106,13 @@
               <a:rPr lang="de-DE"/>
               <a:t>Mastertitelformat bearbeiten</a:t>
             </a:r>
-          </a:p>
-        </p:txBody>
-      </p:sp>
-      <p:sp>
-        <p:nvSpPr>
-          <p:cNvPr id="3" name="Inhaltsplatzhalter 2">
-            <a:extLst>
-              <a:ext uri="{FF2B5EF4-FFF2-40B4-BE49-F238E27FC236}">
-                <a16:creationId xmlns:a16="http://schemas.microsoft.com/office/drawing/2014/main" id="{44D583A4-31A2-CC42-B0D7-499B1AB6C29B}"/>
-              </a:ext>
-            </a:extLst>
-          </p:cNvPr>
+            <a:endParaRPr lang="en-US" dirty="0"/>
+          </a:p>
+        </p:txBody>
+      </p:sp>
+      <p:sp>
+        <p:nvSpPr>
+          <p:cNvPr id="3" name="Content Placeholder 2"/>
           <p:cNvSpPr>
             <a:spLocks noGrp="1"/>
           </p:cNvSpPr>
@@ -1269,8 +1122,8 @@
         </p:nvSpPr>
         <p:spPr>
           <a:xfrm>
-            <a:off x="838200" y="1825625"/>
-            <a:ext cx="5181600" cy="4351338"/>
+            <a:off x="838200" y="1437680"/>
+            <a:ext cx="5181600" cy="3426679"/>
           </a:xfrm>
         </p:spPr>
         <p:txBody>
@@ -1310,18 +1163,13 @@
               <a:rPr lang="de-DE"/>
               <a:t>Fünfte Ebene</a:t>
             </a:r>
-          </a:p>
-        </p:txBody>
-      </p:sp>
-      <p:sp>
-        <p:nvSpPr>
-          <p:cNvPr id="4" name="Inhaltsplatzhalter 3">
-            <a:extLst>
-              <a:ext uri="{FF2B5EF4-FFF2-40B4-BE49-F238E27FC236}">
-                <a16:creationId xmlns:a16="http://schemas.microsoft.com/office/drawing/2014/main" id="{0B7AF8EA-F4FC-9743-8350-1F612E58FCE4}"/>
-              </a:ext>
-            </a:extLst>
-          </p:cNvPr>
+            <a:endParaRPr lang="en-US" dirty="0"/>
+          </a:p>
+        </p:txBody>
+      </p:sp>
+      <p:sp>
+        <p:nvSpPr>
+          <p:cNvPr id="4" name="Content Placeholder 3"/>
           <p:cNvSpPr>
             <a:spLocks noGrp="1"/>
           </p:cNvSpPr>
@@ -1331,8 +1179,8 @@
         </p:nvSpPr>
         <p:spPr>
           <a:xfrm>
-            <a:off x="6172200" y="1825625"/>
-            <a:ext cx="5181600" cy="4351338"/>
+            <a:off x="6172200" y="1437680"/>
+            <a:ext cx="5181600" cy="3426679"/>
           </a:xfrm>
         </p:spPr>
         <p:txBody>
@@ -1372,18 +1220,13 @@
               <a:rPr lang="de-DE"/>
               <a:t>Fünfte Ebene</a:t>
             </a:r>
-          </a:p>
-        </p:txBody>
-      </p:sp>
-      <p:sp>
-        <p:nvSpPr>
-          <p:cNvPr id="5" name="Datumsplatzhalter 4">
-            <a:extLst>
-              <a:ext uri="{FF2B5EF4-FFF2-40B4-BE49-F238E27FC236}">
-                <a16:creationId xmlns:a16="http://schemas.microsoft.com/office/drawing/2014/main" id="{F7C914B9-2923-CE4C-BF56-DA3983D3B2AE}"/>
-              </a:ext>
-            </a:extLst>
-          </p:cNvPr>
+            <a:endParaRPr lang="en-US" dirty="0"/>
+          </a:p>
+        </p:txBody>
+      </p:sp>
+      <p:sp>
+        <p:nvSpPr>
+          <p:cNvPr id="5" name="Date Placeholder 4"/>
           <p:cNvSpPr>
             <a:spLocks noGrp="1"/>
           </p:cNvSpPr>
@@ -1398,7 +1241,7 @@
           <a:p>
             <a:fld id="{1707C51D-322A-654B-9655-3C83443E7C31}" type="datetimeFigureOut">
               <a:rPr lang="de-DE" smtClean="0"/>
-              <a:t>14.11.21</a:t>
+              <a:t>08.12.21</a:t>
             </a:fld>
             <a:endParaRPr lang="de-DE"/>
           </a:p>
@@ -1406,13 +1249,7 @@
       </p:sp>
       <p:sp>
         <p:nvSpPr>
-          <p:cNvPr id="6" name="Fußzeilenplatzhalter 5">
-            <a:extLst>
-              <a:ext uri="{FF2B5EF4-FFF2-40B4-BE49-F238E27FC236}">
-                <a16:creationId xmlns:a16="http://schemas.microsoft.com/office/drawing/2014/main" id="{CE24B83F-D425-F44F-9537-E452A5F108D5}"/>
-              </a:ext>
-            </a:extLst>
-          </p:cNvPr>
+          <p:cNvPr id="6" name="Footer Placeholder 5"/>
           <p:cNvSpPr>
             <a:spLocks noGrp="1"/>
           </p:cNvSpPr>
@@ -1431,13 +1268,7 @@
       </p:sp>
       <p:sp>
         <p:nvSpPr>
-          <p:cNvPr id="7" name="Foliennummernplatzhalter 6">
-            <a:extLst>
-              <a:ext uri="{FF2B5EF4-FFF2-40B4-BE49-F238E27FC236}">
-                <a16:creationId xmlns:a16="http://schemas.microsoft.com/office/drawing/2014/main" id="{572FA61C-D5BD-B24B-A0EB-B11553D3C837}"/>
-              </a:ext>
-            </a:extLst>
-          </p:cNvPr>
+          <p:cNvPr id="7" name="Slide Number Placeholder 6"/>
           <p:cNvSpPr>
             <a:spLocks noGrp="1"/>
           </p:cNvSpPr>
@@ -1461,7 +1292,7 @@
     </p:spTree>
     <p:extLst>
       <p:ext uri="{BB962C8B-B14F-4D97-AF65-F5344CB8AC3E}">
-        <p14:creationId xmlns:p14="http://schemas.microsoft.com/office/powerpoint/2010/main" val="547470379"/>
+        <p14:creationId xmlns:p14="http://schemas.microsoft.com/office/powerpoint/2010/main" val="2769755546"/>
       </p:ext>
     </p:extLst>
   </p:cSld>
@@ -1490,13 +1321,7 @@
       </p:grpSpPr>
       <p:sp>
         <p:nvSpPr>
-          <p:cNvPr id="2" name="Titel 1">
-            <a:extLst>
-              <a:ext uri="{FF2B5EF4-FFF2-40B4-BE49-F238E27FC236}">
-                <a16:creationId xmlns:a16="http://schemas.microsoft.com/office/drawing/2014/main" id="{A3EAD4E4-FD2E-8549-9937-23276EAB71EA}"/>
-              </a:ext>
-            </a:extLst>
-          </p:cNvPr>
+          <p:cNvPr id="2" name="Title 1"/>
           <p:cNvSpPr>
             <a:spLocks noGrp="1"/>
           </p:cNvSpPr>
@@ -1506,8 +1331,8 @@
         </p:nvSpPr>
         <p:spPr>
           <a:xfrm>
-            <a:off x="839788" y="365125"/>
-            <a:ext cx="10515600" cy="1325563"/>
+            <a:off x="839788" y="287536"/>
+            <a:ext cx="10515600" cy="1043881"/>
           </a:xfrm>
         </p:spPr>
         <p:txBody>
@@ -1518,18 +1343,13 @@
               <a:rPr lang="de-DE"/>
               <a:t>Mastertitelformat bearbeiten</a:t>
             </a:r>
-          </a:p>
-        </p:txBody>
-      </p:sp>
-      <p:sp>
-        <p:nvSpPr>
-          <p:cNvPr id="3" name="Textplatzhalter 2">
-            <a:extLst>
-              <a:ext uri="{FF2B5EF4-FFF2-40B4-BE49-F238E27FC236}">
-                <a16:creationId xmlns:a16="http://schemas.microsoft.com/office/drawing/2014/main" id="{62644354-CFDF-EC46-AD0C-020CA56193AF}"/>
-              </a:ext>
-            </a:extLst>
-          </p:cNvPr>
+            <a:endParaRPr lang="en-US" dirty="0"/>
+          </a:p>
+        </p:txBody>
+      </p:sp>
+      <p:sp>
+        <p:nvSpPr>
+          <p:cNvPr id="3" name="Text Placeholder 2"/>
           <p:cNvSpPr>
             <a:spLocks noGrp="1"/>
           </p:cNvSpPr>
@@ -1539,8 +1359,8 @@
         </p:nvSpPr>
         <p:spPr>
           <a:xfrm>
-            <a:off x="839788" y="1681163"/>
-            <a:ext cx="5157787" cy="823912"/>
+            <a:off x="839789" y="1323916"/>
+            <a:ext cx="5157787" cy="648831"/>
           </a:xfrm>
         </p:spPr>
         <p:txBody>
@@ -1548,39 +1368,39 @@
           <a:lstStyle>
             <a:lvl1pPr marL="0" indent="0">
               <a:buNone/>
-              <a:defRPr sz="2400" b="1"/>
+              <a:defRPr sz="1890" b="1"/>
             </a:lvl1pPr>
-            <a:lvl2pPr marL="457200" indent="0">
-              <a:buNone/>
-              <a:defRPr sz="2000" b="1"/>
+            <a:lvl2pPr marL="360045" indent="0">
+              <a:buNone/>
+              <a:defRPr sz="1575" b="1"/>
             </a:lvl2pPr>
-            <a:lvl3pPr marL="914400" indent="0">
-              <a:buNone/>
-              <a:defRPr sz="1800" b="1"/>
+            <a:lvl3pPr marL="720090" indent="0">
+              <a:buNone/>
+              <a:defRPr sz="1418" b="1"/>
             </a:lvl3pPr>
-            <a:lvl4pPr marL="1371600" indent="0">
-              <a:buNone/>
-              <a:defRPr sz="1600" b="1"/>
+            <a:lvl4pPr marL="1080135" indent="0">
+              <a:buNone/>
+              <a:defRPr sz="1260" b="1"/>
             </a:lvl4pPr>
-            <a:lvl5pPr marL="1828800" indent="0">
-              <a:buNone/>
-              <a:defRPr sz="1600" b="1"/>
+            <a:lvl5pPr marL="1440180" indent="0">
+              <a:buNone/>
+              <a:defRPr sz="1260" b="1"/>
             </a:lvl5pPr>
-            <a:lvl6pPr marL="2286000" indent="0">
-              <a:buNone/>
-              <a:defRPr sz="1600" b="1"/>
+            <a:lvl6pPr marL="1800225" indent="0">
+              <a:buNone/>
+              <a:defRPr sz="1260" b="1"/>
             </a:lvl6pPr>
-            <a:lvl7pPr marL="2743200" indent="0">
-              <a:buNone/>
-              <a:defRPr sz="1600" b="1"/>
+            <a:lvl7pPr marL="2160270" indent="0">
+              <a:buNone/>
+              <a:defRPr sz="1260" b="1"/>
             </a:lvl7pPr>
-            <a:lvl8pPr marL="3200400" indent="0">
-              <a:buNone/>
-              <a:defRPr sz="1600" b="1"/>
+            <a:lvl8pPr marL="2520315" indent="0">
+              <a:buNone/>
+              <a:defRPr sz="1260" b="1"/>
             </a:lvl8pPr>
-            <a:lvl9pPr marL="3657600" indent="0">
-              <a:buNone/>
-              <a:defRPr sz="1600" b="1"/>
+            <a:lvl9pPr marL="2880360" indent="0">
+              <a:buNone/>
+              <a:defRPr sz="1260" b="1"/>
             </a:lvl9pPr>
           </a:lstStyle>
           <a:p>
@@ -1594,13 +1414,7 @@
       </p:sp>
       <p:sp>
         <p:nvSpPr>
-          <p:cNvPr id="4" name="Inhaltsplatzhalter 3">
-            <a:extLst>
-              <a:ext uri="{FF2B5EF4-FFF2-40B4-BE49-F238E27FC236}">
-                <a16:creationId xmlns:a16="http://schemas.microsoft.com/office/drawing/2014/main" id="{5EEA741D-C4D5-EC41-BF60-0F1408071441}"/>
-              </a:ext>
-            </a:extLst>
-          </p:cNvPr>
+          <p:cNvPr id="4" name="Content Placeholder 3"/>
           <p:cNvSpPr>
             <a:spLocks noGrp="1"/>
           </p:cNvSpPr>
@@ -1610,8 +1424,8 @@
         </p:nvSpPr>
         <p:spPr>
           <a:xfrm>
-            <a:off x="839788" y="2505075"/>
-            <a:ext cx="5157787" cy="3684588"/>
+            <a:off x="839789" y="1972747"/>
+            <a:ext cx="5157787" cy="2901613"/>
           </a:xfrm>
         </p:spPr>
         <p:txBody>
@@ -1651,18 +1465,13 @@
               <a:rPr lang="de-DE"/>
               <a:t>Fünfte Ebene</a:t>
             </a:r>
-          </a:p>
-        </p:txBody>
-      </p:sp>
-      <p:sp>
-        <p:nvSpPr>
-          <p:cNvPr id="5" name="Textplatzhalter 4">
-            <a:extLst>
-              <a:ext uri="{FF2B5EF4-FFF2-40B4-BE49-F238E27FC236}">
-                <a16:creationId xmlns:a16="http://schemas.microsoft.com/office/drawing/2014/main" id="{EB6EEACD-2B4E-954A-96D0-21EC04955BB3}"/>
-              </a:ext>
-            </a:extLst>
-          </p:cNvPr>
+            <a:endParaRPr lang="en-US" dirty="0"/>
+          </a:p>
+        </p:txBody>
+      </p:sp>
+      <p:sp>
+        <p:nvSpPr>
+          <p:cNvPr id="5" name="Text Placeholder 4"/>
           <p:cNvSpPr>
             <a:spLocks noGrp="1"/>
           </p:cNvSpPr>
@@ -1672,8 +1481,8 @@
         </p:nvSpPr>
         <p:spPr>
           <a:xfrm>
-            <a:off x="6172200" y="1681163"/>
-            <a:ext cx="5183188" cy="823912"/>
+            <a:off x="6172200" y="1323916"/>
+            <a:ext cx="5183188" cy="648831"/>
           </a:xfrm>
         </p:spPr>
         <p:txBody>
@@ -1681,39 +1490,39 @@
           <a:lstStyle>
             <a:lvl1pPr marL="0" indent="0">
               <a:buNone/>
-              <a:defRPr sz="2400" b="1"/>
+              <a:defRPr sz="1890" b="1"/>
             </a:lvl1pPr>
-            <a:lvl2pPr marL="457200" indent="0">
-              <a:buNone/>
-              <a:defRPr sz="2000" b="1"/>
+            <a:lvl2pPr marL="360045" indent="0">
+              <a:buNone/>
+              <a:defRPr sz="1575" b="1"/>
             </a:lvl2pPr>
-            <a:lvl3pPr marL="914400" indent="0">
-              <a:buNone/>
-              <a:defRPr sz="1800" b="1"/>
+            <a:lvl3pPr marL="720090" indent="0">
+              <a:buNone/>
+              <a:defRPr sz="1418" b="1"/>
             </a:lvl3pPr>
-            <a:lvl4pPr marL="1371600" indent="0">
-              <a:buNone/>
-              <a:defRPr sz="1600" b="1"/>
+            <a:lvl4pPr marL="1080135" indent="0">
+              <a:buNone/>
+              <a:defRPr sz="1260" b="1"/>
             </a:lvl4pPr>
-            <a:lvl5pPr marL="1828800" indent="0">
-              <a:buNone/>
-              <a:defRPr sz="1600" b="1"/>
+            <a:lvl5pPr marL="1440180" indent="0">
+              <a:buNone/>
+              <a:defRPr sz="1260" b="1"/>
             </a:lvl5pPr>
-            <a:lvl6pPr marL="2286000" indent="0">
-              <a:buNone/>
-              <a:defRPr sz="1600" b="1"/>
+            <a:lvl6pPr marL="1800225" indent="0">
+              <a:buNone/>
+              <a:defRPr sz="1260" b="1"/>
             </a:lvl6pPr>
-            <a:lvl7pPr marL="2743200" indent="0">
-              <a:buNone/>
-              <a:defRPr sz="1600" b="1"/>
+            <a:lvl7pPr marL="2160270" indent="0">
+              <a:buNone/>
+              <a:defRPr sz="1260" b="1"/>
             </a:lvl7pPr>
-            <a:lvl8pPr marL="3200400" indent="0">
-              <a:buNone/>
-              <a:defRPr sz="1600" b="1"/>
+            <a:lvl8pPr marL="2520315" indent="0">
+              <a:buNone/>
+              <a:defRPr sz="1260" b="1"/>
             </a:lvl8pPr>
-            <a:lvl9pPr marL="3657600" indent="0">
-              <a:buNone/>
-              <a:defRPr sz="1600" b="1"/>
+            <a:lvl9pPr marL="2880360" indent="0">
+              <a:buNone/>
+              <a:defRPr sz="1260" b="1"/>
             </a:lvl9pPr>
           </a:lstStyle>
           <a:p>
@@ -1727,13 +1536,7 @@
       </p:sp>
       <p:sp>
         <p:nvSpPr>
-          <p:cNvPr id="6" name="Inhaltsplatzhalter 5">
-            <a:extLst>
-              <a:ext uri="{FF2B5EF4-FFF2-40B4-BE49-F238E27FC236}">
-                <a16:creationId xmlns:a16="http://schemas.microsoft.com/office/drawing/2014/main" id="{10E36F36-9B64-8D49-999C-953130A806A4}"/>
-              </a:ext>
-            </a:extLst>
-          </p:cNvPr>
+          <p:cNvPr id="6" name="Content Placeholder 5"/>
           <p:cNvSpPr>
             <a:spLocks noGrp="1"/>
           </p:cNvSpPr>
@@ -1743,8 +1546,8 @@
         </p:nvSpPr>
         <p:spPr>
           <a:xfrm>
-            <a:off x="6172200" y="2505075"/>
-            <a:ext cx="5183188" cy="3684588"/>
+            <a:off x="6172200" y="1972747"/>
+            <a:ext cx="5183188" cy="2901613"/>
           </a:xfrm>
         </p:spPr>
         <p:txBody>
@@ -1784,18 +1587,13 @@
               <a:rPr lang="de-DE"/>
               <a:t>Fünfte Ebene</a:t>
             </a:r>
-          </a:p>
-        </p:txBody>
-      </p:sp>
-      <p:sp>
-        <p:nvSpPr>
-          <p:cNvPr id="7" name="Datumsplatzhalter 6">
-            <a:extLst>
-              <a:ext uri="{FF2B5EF4-FFF2-40B4-BE49-F238E27FC236}">
-                <a16:creationId xmlns:a16="http://schemas.microsoft.com/office/drawing/2014/main" id="{A9F46F8D-B22E-1D41-8892-B764C8F3D91D}"/>
-              </a:ext>
-            </a:extLst>
-          </p:cNvPr>
+            <a:endParaRPr lang="en-US" dirty="0"/>
+          </a:p>
+        </p:txBody>
+      </p:sp>
+      <p:sp>
+        <p:nvSpPr>
+          <p:cNvPr id="7" name="Date Placeholder 6"/>
           <p:cNvSpPr>
             <a:spLocks noGrp="1"/>
           </p:cNvSpPr>
@@ -1810,7 +1608,7 @@
           <a:p>
             <a:fld id="{1707C51D-322A-654B-9655-3C83443E7C31}" type="datetimeFigureOut">
               <a:rPr lang="de-DE" smtClean="0"/>
-              <a:t>14.11.21</a:t>
+              <a:t>08.12.21</a:t>
             </a:fld>
             <a:endParaRPr lang="de-DE"/>
           </a:p>
@@ -1818,13 +1616,7 @@
       </p:sp>
       <p:sp>
         <p:nvSpPr>
-          <p:cNvPr id="8" name="Fußzeilenplatzhalter 7">
-            <a:extLst>
-              <a:ext uri="{FF2B5EF4-FFF2-40B4-BE49-F238E27FC236}">
-                <a16:creationId xmlns:a16="http://schemas.microsoft.com/office/drawing/2014/main" id="{43C563E8-CF88-DD4A-92CD-4264C7EA64A8}"/>
-              </a:ext>
-            </a:extLst>
-          </p:cNvPr>
+          <p:cNvPr id="8" name="Footer Placeholder 7"/>
           <p:cNvSpPr>
             <a:spLocks noGrp="1"/>
           </p:cNvSpPr>
@@ -1843,13 +1635,7 @@
       </p:sp>
       <p:sp>
         <p:nvSpPr>
-          <p:cNvPr id="9" name="Foliennummernplatzhalter 8">
-            <a:extLst>
-              <a:ext uri="{FF2B5EF4-FFF2-40B4-BE49-F238E27FC236}">
-                <a16:creationId xmlns:a16="http://schemas.microsoft.com/office/drawing/2014/main" id="{C9EEAD02-2DA6-3741-A89D-0D60C02737B0}"/>
-              </a:ext>
-            </a:extLst>
-          </p:cNvPr>
+          <p:cNvPr id="9" name="Slide Number Placeholder 8"/>
           <p:cNvSpPr>
             <a:spLocks noGrp="1"/>
           </p:cNvSpPr>
@@ -1873,7 +1659,7 @@
     </p:spTree>
     <p:extLst>
       <p:ext uri="{BB962C8B-B14F-4D97-AF65-F5344CB8AC3E}">
-        <p14:creationId xmlns:p14="http://schemas.microsoft.com/office/powerpoint/2010/main" val="2850027379"/>
+        <p14:creationId xmlns:p14="http://schemas.microsoft.com/office/powerpoint/2010/main" val="3036309967"/>
       </p:ext>
     </p:extLst>
   </p:cSld>
@@ -1902,13 +1688,7 @@
       </p:grpSpPr>
       <p:sp>
         <p:nvSpPr>
-          <p:cNvPr id="2" name="Titel 1">
-            <a:extLst>
-              <a:ext uri="{FF2B5EF4-FFF2-40B4-BE49-F238E27FC236}">
-                <a16:creationId xmlns:a16="http://schemas.microsoft.com/office/drawing/2014/main" id="{CC56A2B6-289C-2743-807D-2115C9617E35}"/>
-              </a:ext>
-            </a:extLst>
-          </p:cNvPr>
+          <p:cNvPr id="2" name="Title 1"/>
           <p:cNvSpPr>
             <a:spLocks noGrp="1"/>
           </p:cNvSpPr>
@@ -1925,18 +1705,13 @@
               <a:rPr lang="de-DE"/>
               <a:t>Mastertitelformat bearbeiten</a:t>
             </a:r>
-          </a:p>
-        </p:txBody>
-      </p:sp>
-      <p:sp>
-        <p:nvSpPr>
-          <p:cNvPr id="3" name="Datumsplatzhalter 2">
-            <a:extLst>
-              <a:ext uri="{FF2B5EF4-FFF2-40B4-BE49-F238E27FC236}">
-                <a16:creationId xmlns:a16="http://schemas.microsoft.com/office/drawing/2014/main" id="{C4F21548-1F29-6544-A627-ADC57E449525}"/>
-              </a:ext>
-            </a:extLst>
-          </p:cNvPr>
+            <a:endParaRPr lang="en-US" dirty="0"/>
+          </a:p>
+        </p:txBody>
+      </p:sp>
+      <p:sp>
+        <p:nvSpPr>
+          <p:cNvPr id="3" name="Date Placeholder 2"/>
           <p:cNvSpPr>
             <a:spLocks noGrp="1"/>
           </p:cNvSpPr>
@@ -1951,7 +1726,7 @@
           <a:p>
             <a:fld id="{1707C51D-322A-654B-9655-3C83443E7C31}" type="datetimeFigureOut">
               <a:rPr lang="de-DE" smtClean="0"/>
-              <a:t>14.11.21</a:t>
+              <a:t>08.12.21</a:t>
             </a:fld>
             <a:endParaRPr lang="de-DE"/>
           </a:p>
@@ -1959,13 +1734,7 @@
       </p:sp>
       <p:sp>
         <p:nvSpPr>
-          <p:cNvPr id="4" name="Fußzeilenplatzhalter 3">
-            <a:extLst>
-              <a:ext uri="{FF2B5EF4-FFF2-40B4-BE49-F238E27FC236}">
-                <a16:creationId xmlns:a16="http://schemas.microsoft.com/office/drawing/2014/main" id="{89E8E69A-B47E-1147-8B7E-DF298EEC47AE}"/>
-              </a:ext>
-            </a:extLst>
-          </p:cNvPr>
+          <p:cNvPr id="4" name="Footer Placeholder 3"/>
           <p:cNvSpPr>
             <a:spLocks noGrp="1"/>
           </p:cNvSpPr>
@@ -1984,13 +1753,7 @@
       </p:sp>
       <p:sp>
         <p:nvSpPr>
-          <p:cNvPr id="5" name="Foliennummernplatzhalter 4">
-            <a:extLst>
-              <a:ext uri="{FF2B5EF4-FFF2-40B4-BE49-F238E27FC236}">
-                <a16:creationId xmlns:a16="http://schemas.microsoft.com/office/drawing/2014/main" id="{F87A9B07-B0DC-664D-A64E-16DABE5AC479}"/>
-              </a:ext>
-            </a:extLst>
-          </p:cNvPr>
+          <p:cNvPr id="5" name="Slide Number Placeholder 4"/>
           <p:cNvSpPr>
             <a:spLocks noGrp="1"/>
           </p:cNvSpPr>
@@ -2014,7 +1777,7 @@
     </p:spTree>
     <p:extLst>
       <p:ext uri="{BB962C8B-B14F-4D97-AF65-F5344CB8AC3E}">
-        <p14:creationId xmlns:p14="http://schemas.microsoft.com/office/powerpoint/2010/main" val="2914979974"/>
+        <p14:creationId xmlns:p14="http://schemas.microsoft.com/office/powerpoint/2010/main" val="43452143"/>
       </p:ext>
     </p:extLst>
   </p:cSld>
@@ -2043,13 +1806,7 @@
       </p:grpSpPr>
       <p:sp>
         <p:nvSpPr>
-          <p:cNvPr id="2" name="Datumsplatzhalter 1">
-            <a:extLst>
-              <a:ext uri="{FF2B5EF4-FFF2-40B4-BE49-F238E27FC236}">
-                <a16:creationId xmlns:a16="http://schemas.microsoft.com/office/drawing/2014/main" id="{717AF97F-0ECF-CF4C-A3BB-725B895B7A88}"/>
-              </a:ext>
-            </a:extLst>
-          </p:cNvPr>
+          <p:cNvPr id="2" name="Date Placeholder 1"/>
           <p:cNvSpPr>
             <a:spLocks noGrp="1"/>
           </p:cNvSpPr>
@@ -2064,7 +1821,7 @@
           <a:p>
             <a:fld id="{1707C51D-322A-654B-9655-3C83443E7C31}" type="datetimeFigureOut">
               <a:rPr lang="de-DE" smtClean="0"/>
-              <a:t>14.11.21</a:t>
+              <a:t>08.12.21</a:t>
             </a:fld>
             <a:endParaRPr lang="de-DE"/>
           </a:p>
@@ -2072,13 +1829,7 @@
       </p:sp>
       <p:sp>
         <p:nvSpPr>
-          <p:cNvPr id="3" name="Fußzeilenplatzhalter 2">
-            <a:extLst>
-              <a:ext uri="{FF2B5EF4-FFF2-40B4-BE49-F238E27FC236}">
-                <a16:creationId xmlns:a16="http://schemas.microsoft.com/office/drawing/2014/main" id="{1445883E-D185-F940-A558-C32C853005FE}"/>
-              </a:ext>
-            </a:extLst>
-          </p:cNvPr>
+          <p:cNvPr id="3" name="Footer Placeholder 2"/>
           <p:cNvSpPr>
             <a:spLocks noGrp="1"/>
           </p:cNvSpPr>
@@ -2097,13 +1848,7 @@
       </p:sp>
       <p:sp>
         <p:nvSpPr>
-          <p:cNvPr id="4" name="Foliennummernplatzhalter 3">
-            <a:extLst>
-              <a:ext uri="{FF2B5EF4-FFF2-40B4-BE49-F238E27FC236}">
-                <a16:creationId xmlns:a16="http://schemas.microsoft.com/office/drawing/2014/main" id="{A84D851C-9857-6A43-9105-386E93235A72}"/>
-              </a:ext>
-            </a:extLst>
-          </p:cNvPr>
+          <p:cNvPr id="4" name="Slide Number Placeholder 3"/>
           <p:cNvSpPr>
             <a:spLocks noGrp="1"/>
           </p:cNvSpPr>
@@ -2127,7 +1872,7 @@
     </p:spTree>
     <p:extLst>
       <p:ext uri="{BB962C8B-B14F-4D97-AF65-F5344CB8AC3E}">
-        <p14:creationId xmlns:p14="http://schemas.microsoft.com/office/powerpoint/2010/main" val="3125304650"/>
+        <p14:creationId xmlns:p14="http://schemas.microsoft.com/office/powerpoint/2010/main" val="327732290"/>
       </p:ext>
     </p:extLst>
   </p:cSld>
@@ -2156,13 +1901,7 @@
       </p:grpSpPr>
       <p:sp>
         <p:nvSpPr>
-          <p:cNvPr id="2" name="Titel 1">
-            <a:extLst>
-              <a:ext uri="{FF2B5EF4-FFF2-40B4-BE49-F238E27FC236}">
-                <a16:creationId xmlns:a16="http://schemas.microsoft.com/office/drawing/2014/main" id="{B1EEF78B-9F38-5542-BB97-15E784705594}"/>
-              </a:ext>
-            </a:extLst>
-          </p:cNvPr>
+          <p:cNvPr id="2" name="Title 1"/>
           <p:cNvSpPr>
             <a:spLocks noGrp="1"/>
           </p:cNvSpPr>
@@ -2172,15 +1911,15 @@
         </p:nvSpPr>
         <p:spPr>
           <a:xfrm>
-            <a:off x="839788" y="457200"/>
-            <a:ext cx="3932237" cy="1600200"/>
+            <a:off x="839789" y="360045"/>
+            <a:ext cx="3932237" cy="1260158"/>
           </a:xfrm>
         </p:spPr>
         <p:txBody>
           <a:bodyPr anchor="b"/>
           <a:lstStyle>
             <a:lvl1pPr>
-              <a:defRPr sz="3200"/>
+              <a:defRPr sz="2520"/>
             </a:lvl1pPr>
           </a:lstStyle>
           <a:p>
@@ -2188,18 +1927,13 @@
               <a:rPr lang="de-DE"/>
               <a:t>Mastertitelformat bearbeiten</a:t>
             </a:r>
-          </a:p>
-        </p:txBody>
-      </p:sp>
-      <p:sp>
-        <p:nvSpPr>
-          <p:cNvPr id="3" name="Inhaltsplatzhalter 2">
-            <a:extLst>
-              <a:ext uri="{FF2B5EF4-FFF2-40B4-BE49-F238E27FC236}">
-                <a16:creationId xmlns:a16="http://schemas.microsoft.com/office/drawing/2014/main" id="{4234D610-731D-9649-B0D1-B532C5987597}"/>
-              </a:ext>
-            </a:extLst>
-          </p:cNvPr>
+            <a:endParaRPr lang="en-US" dirty="0"/>
+          </a:p>
+        </p:txBody>
+      </p:sp>
+      <p:sp>
+        <p:nvSpPr>
+          <p:cNvPr id="3" name="Content Placeholder 2"/>
           <p:cNvSpPr>
             <a:spLocks noGrp="1"/>
           </p:cNvSpPr>
@@ -2209,39 +1943,39 @@
         </p:nvSpPr>
         <p:spPr>
           <a:xfrm>
-            <a:off x="5183188" y="987425"/>
-            <a:ext cx="6172200" cy="4873625"/>
+            <a:off x="5183188" y="777597"/>
+            <a:ext cx="6172200" cy="3837980"/>
           </a:xfrm>
         </p:spPr>
         <p:txBody>
           <a:bodyPr/>
           <a:lstStyle>
             <a:lvl1pPr>
-              <a:defRPr sz="3200"/>
+              <a:defRPr sz="2520"/>
             </a:lvl1pPr>
             <a:lvl2pPr>
-              <a:defRPr sz="2800"/>
+              <a:defRPr sz="2205"/>
             </a:lvl2pPr>
             <a:lvl3pPr>
-              <a:defRPr sz="2400"/>
+              <a:defRPr sz="1890"/>
             </a:lvl3pPr>
             <a:lvl4pPr>
-              <a:defRPr sz="2000"/>
+              <a:defRPr sz="1575"/>
             </a:lvl4pPr>
             <a:lvl5pPr>
-              <a:defRPr sz="2000"/>
+              <a:defRPr sz="1575"/>
             </a:lvl5pPr>
             <a:lvl6pPr>
-              <a:defRPr sz="2000"/>
+              <a:defRPr sz="1575"/>
             </a:lvl6pPr>
             <a:lvl7pPr>
-              <a:defRPr sz="2000"/>
+              <a:defRPr sz="1575"/>
             </a:lvl7pPr>
             <a:lvl8pPr>
-              <a:defRPr sz="2000"/>
+              <a:defRPr sz="1575"/>
             </a:lvl8pPr>
             <a:lvl9pPr>
-              <a:defRPr sz="2000"/>
+              <a:defRPr sz="1575"/>
             </a:lvl9pPr>
           </a:lstStyle>
           <a:p>
@@ -2278,18 +2012,13 @@
               <a:rPr lang="de-DE"/>
               <a:t>Fünfte Ebene</a:t>
             </a:r>
-          </a:p>
-        </p:txBody>
-      </p:sp>
-      <p:sp>
-        <p:nvSpPr>
-          <p:cNvPr id="4" name="Textplatzhalter 3">
-            <a:extLst>
-              <a:ext uri="{FF2B5EF4-FFF2-40B4-BE49-F238E27FC236}">
-                <a16:creationId xmlns:a16="http://schemas.microsoft.com/office/drawing/2014/main" id="{9DAF2ABB-EAAB-C140-A0F9-8E4C1928CCD7}"/>
-              </a:ext>
-            </a:extLst>
-          </p:cNvPr>
+            <a:endParaRPr lang="en-US" dirty="0"/>
+          </a:p>
+        </p:txBody>
+      </p:sp>
+      <p:sp>
+        <p:nvSpPr>
+          <p:cNvPr id="4" name="Text Placeholder 3"/>
           <p:cNvSpPr>
             <a:spLocks noGrp="1"/>
           </p:cNvSpPr>
@@ -2299,8 +2028,8 @@
         </p:nvSpPr>
         <p:spPr>
           <a:xfrm>
-            <a:off x="839788" y="2057400"/>
-            <a:ext cx="3932237" cy="3811588"/>
+            <a:off x="839789" y="1620202"/>
+            <a:ext cx="3932237" cy="3001626"/>
           </a:xfrm>
         </p:spPr>
         <p:txBody>
@@ -2308,39 +2037,39 @@
           <a:lstStyle>
             <a:lvl1pPr marL="0" indent="0">
               <a:buNone/>
-              <a:defRPr sz="1600"/>
+              <a:defRPr sz="1260"/>
             </a:lvl1pPr>
-            <a:lvl2pPr marL="457200" indent="0">
-              <a:buNone/>
-              <a:defRPr sz="1400"/>
+            <a:lvl2pPr marL="360045" indent="0">
+              <a:buNone/>
+              <a:defRPr sz="1103"/>
             </a:lvl2pPr>
-            <a:lvl3pPr marL="914400" indent="0">
-              <a:buNone/>
-              <a:defRPr sz="1200"/>
+            <a:lvl3pPr marL="720090" indent="0">
+              <a:buNone/>
+              <a:defRPr sz="945"/>
             </a:lvl3pPr>
-            <a:lvl4pPr marL="1371600" indent="0">
-              <a:buNone/>
-              <a:defRPr sz="1000"/>
+            <a:lvl4pPr marL="1080135" indent="0">
+              <a:buNone/>
+              <a:defRPr sz="788"/>
             </a:lvl4pPr>
-            <a:lvl5pPr marL="1828800" indent="0">
-              <a:buNone/>
-              <a:defRPr sz="1000"/>
+            <a:lvl5pPr marL="1440180" indent="0">
+              <a:buNone/>
+              <a:defRPr sz="788"/>
             </a:lvl5pPr>
-            <a:lvl6pPr marL="2286000" indent="0">
-              <a:buNone/>
-              <a:defRPr sz="1000"/>
+            <a:lvl6pPr marL="1800225" indent="0">
+              <a:buNone/>
+              <a:defRPr sz="788"/>
             </a:lvl6pPr>
-            <a:lvl7pPr marL="2743200" indent="0">
-              <a:buNone/>
-              <a:defRPr sz="1000"/>
+            <a:lvl7pPr marL="2160270" indent="0">
+              <a:buNone/>
+              <a:defRPr sz="788"/>
             </a:lvl7pPr>
-            <a:lvl8pPr marL="3200400" indent="0">
-              <a:buNone/>
-              <a:defRPr sz="1000"/>
+            <a:lvl8pPr marL="2520315" indent="0">
+              <a:buNone/>
+              <a:defRPr sz="788"/>
             </a:lvl8pPr>
-            <a:lvl9pPr marL="3657600" indent="0">
-              <a:buNone/>
-              <a:defRPr sz="1000"/>
+            <a:lvl9pPr marL="2880360" indent="0">
+              <a:buNone/>
+              <a:defRPr sz="788"/>
             </a:lvl9pPr>
           </a:lstStyle>
           <a:p>
@@ -2354,13 +2083,7 @@
       </p:sp>
       <p:sp>
         <p:nvSpPr>
-          <p:cNvPr id="5" name="Datumsplatzhalter 4">
-            <a:extLst>
-              <a:ext uri="{FF2B5EF4-FFF2-40B4-BE49-F238E27FC236}">
-                <a16:creationId xmlns:a16="http://schemas.microsoft.com/office/drawing/2014/main" id="{54F2C934-B16F-E342-B2CC-0874BCC598F1}"/>
-              </a:ext>
-            </a:extLst>
-          </p:cNvPr>
+          <p:cNvPr id="5" name="Date Placeholder 4"/>
           <p:cNvSpPr>
             <a:spLocks noGrp="1"/>
           </p:cNvSpPr>
@@ -2375,7 +2098,7 @@
           <a:p>
             <a:fld id="{1707C51D-322A-654B-9655-3C83443E7C31}" type="datetimeFigureOut">
               <a:rPr lang="de-DE" smtClean="0"/>
-              <a:t>14.11.21</a:t>
+              <a:t>08.12.21</a:t>
             </a:fld>
             <a:endParaRPr lang="de-DE"/>
           </a:p>
@@ -2383,13 +2106,7 @@
       </p:sp>
       <p:sp>
         <p:nvSpPr>
-          <p:cNvPr id="6" name="Fußzeilenplatzhalter 5">
-            <a:extLst>
-              <a:ext uri="{FF2B5EF4-FFF2-40B4-BE49-F238E27FC236}">
-                <a16:creationId xmlns:a16="http://schemas.microsoft.com/office/drawing/2014/main" id="{5296C0BE-8C75-0F45-B952-1CC312AE8D8E}"/>
-              </a:ext>
-            </a:extLst>
-          </p:cNvPr>
+          <p:cNvPr id="6" name="Footer Placeholder 5"/>
           <p:cNvSpPr>
             <a:spLocks noGrp="1"/>
           </p:cNvSpPr>
@@ -2408,13 +2125,7 @@
       </p:sp>
       <p:sp>
         <p:nvSpPr>
-          <p:cNvPr id="7" name="Foliennummernplatzhalter 6">
-            <a:extLst>
-              <a:ext uri="{FF2B5EF4-FFF2-40B4-BE49-F238E27FC236}">
-                <a16:creationId xmlns:a16="http://schemas.microsoft.com/office/drawing/2014/main" id="{C566A2FB-FAC6-0D44-8FCF-B53A73814B29}"/>
-              </a:ext>
-            </a:extLst>
-          </p:cNvPr>
+          <p:cNvPr id="7" name="Slide Number Placeholder 6"/>
           <p:cNvSpPr>
             <a:spLocks noGrp="1"/>
           </p:cNvSpPr>
@@ -2438,7 +2149,7 @@
     </p:spTree>
     <p:extLst>
       <p:ext uri="{BB962C8B-B14F-4D97-AF65-F5344CB8AC3E}">
-        <p14:creationId xmlns:p14="http://schemas.microsoft.com/office/powerpoint/2010/main" val="3404463604"/>
+        <p14:creationId xmlns:p14="http://schemas.microsoft.com/office/powerpoint/2010/main" val="60408780"/>
       </p:ext>
     </p:extLst>
   </p:cSld>
@@ -2467,13 +2178,7 @@
       </p:grpSpPr>
       <p:sp>
         <p:nvSpPr>
-          <p:cNvPr id="2" name="Titel 1">
-            <a:extLst>
-              <a:ext uri="{FF2B5EF4-FFF2-40B4-BE49-F238E27FC236}">
-                <a16:creationId xmlns:a16="http://schemas.microsoft.com/office/drawing/2014/main" id="{6C128351-C186-4749-971F-F39FB2E05739}"/>
-              </a:ext>
-            </a:extLst>
-          </p:cNvPr>
+          <p:cNvPr id="2" name="Title 1"/>
           <p:cNvSpPr>
             <a:spLocks noGrp="1"/>
           </p:cNvSpPr>
@@ -2483,15 +2188,15 @@
         </p:nvSpPr>
         <p:spPr>
           <a:xfrm>
-            <a:off x="839788" y="457200"/>
-            <a:ext cx="3932237" cy="1600200"/>
+            <a:off x="839789" y="360045"/>
+            <a:ext cx="3932237" cy="1260158"/>
           </a:xfrm>
         </p:spPr>
         <p:txBody>
           <a:bodyPr anchor="b"/>
           <a:lstStyle>
             <a:lvl1pPr>
-              <a:defRPr sz="3200"/>
+              <a:defRPr sz="2520"/>
             </a:lvl1pPr>
           </a:lstStyle>
           <a:p>
@@ -2499,20 +2204,15 @@
               <a:rPr lang="de-DE"/>
               <a:t>Mastertitelformat bearbeiten</a:t>
             </a:r>
-          </a:p>
-        </p:txBody>
-      </p:sp>
-      <p:sp>
-        <p:nvSpPr>
-          <p:cNvPr id="3" name="Bildplatzhalter 2">
-            <a:extLst>
-              <a:ext uri="{FF2B5EF4-FFF2-40B4-BE49-F238E27FC236}">
-                <a16:creationId xmlns:a16="http://schemas.microsoft.com/office/drawing/2014/main" id="{7344FA8C-FBB6-3744-AC40-4B7E719CB881}"/>
-              </a:ext>
-            </a:extLst>
-          </p:cNvPr>
-          <p:cNvSpPr>
-            <a:spLocks noGrp="1"/>
+            <a:endParaRPr lang="en-US" dirty="0"/>
+          </a:p>
+        </p:txBody>
+      </p:sp>
+      <p:sp>
+        <p:nvSpPr>
+          <p:cNvPr id="3" name="Picture Placeholder 2"/>
+          <p:cNvSpPr>
+            <a:spLocks noGrp="1" noChangeAspect="1"/>
           </p:cNvSpPr>
           <p:nvPr>
             <p:ph type="pic" idx="1"/>
@@ -2520,8 +2220,73 @@
         </p:nvSpPr>
         <p:spPr>
           <a:xfrm>
-            <a:off x="5183188" y="987425"/>
-            <a:ext cx="6172200" cy="4873625"/>
+            <a:off x="5183188" y="777597"/>
+            <a:ext cx="6172200" cy="3837980"/>
+          </a:xfrm>
+        </p:spPr>
+        <p:txBody>
+          <a:bodyPr anchor="t"/>
+          <a:lstStyle>
+            <a:lvl1pPr marL="0" indent="0">
+              <a:buNone/>
+              <a:defRPr sz="2520"/>
+            </a:lvl1pPr>
+            <a:lvl2pPr marL="360045" indent="0">
+              <a:buNone/>
+              <a:defRPr sz="2205"/>
+            </a:lvl2pPr>
+            <a:lvl3pPr marL="720090" indent="0">
+              <a:buNone/>
+              <a:defRPr sz="1890"/>
+            </a:lvl3pPr>
+            <a:lvl4pPr marL="1080135" indent="0">
+              <a:buNone/>
+              <a:defRPr sz="1575"/>
+            </a:lvl4pPr>
+            <a:lvl5pPr marL="1440180" indent="0">
+              <a:buNone/>
+              <a:defRPr sz="1575"/>
+            </a:lvl5pPr>
+            <a:lvl6pPr marL="1800225" indent="0">
+              <a:buNone/>
+              <a:defRPr sz="1575"/>
+            </a:lvl6pPr>
+            <a:lvl7pPr marL="2160270" indent="0">
+              <a:buNone/>
+              <a:defRPr sz="1575"/>
+            </a:lvl7pPr>
+            <a:lvl8pPr marL="2520315" indent="0">
+              <a:buNone/>
+              <a:defRPr sz="1575"/>
+            </a:lvl8pPr>
+            <a:lvl9pPr marL="2880360" indent="0">
+              <a:buNone/>
+              <a:defRPr sz="1575"/>
+            </a:lvl9pPr>
+          </a:lstStyle>
+          <a:p>
+            <a:r>
+              <a:rPr lang="de-DE"/>
+              <a:t>Bild durch Klicken auf Symbol hinzufügen</a:t>
+            </a:r>
+            <a:endParaRPr lang="en-US" dirty="0"/>
+          </a:p>
+        </p:txBody>
+      </p:sp>
+      <p:sp>
+        <p:nvSpPr>
+          <p:cNvPr id="4" name="Text Placeholder 3"/>
+          <p:cNvSpPr>
+            <a:spLocks noGrp="1"/>
+          </p:cNvSpPr>
+          <p:nvPr>
+            <p:ph type="body" sz="half" idx="2"/>
+          </p:nvPr>
+        </p:nvSpPr>
+        <p:spPr>
+          <a:xfrm>
+            <a:off x="839789" y="1620202"/>
+            <a:ext cx="3932237" cy="3001626"/>
           </a:xfrm>
         </p:spPr>
         <p:txBody>
@@ -2529,109 +2294,42 @@
           <a:lstStyle>
             <a:lvl1pPr marL="0" indent="0">
               <a:buNone/>
-              <a:defRPr sz="3200"/>
+              <a:defRPr sz="1260"/>
             </a:lvl1pPr>
-            <a:lvl2pPr marL="457200" indent="0">
-              <a:buNone/>
-              <a:defRPr sz="2800"/>
+            <a:lvl2pPr marL="360045" indent="0">
+              <a:buNone/>
+              <a:defRPr sz="1103"/>
             </a:lvl2pPr>
-            <a:lvl3pPr marL="914400" indent="0">
-              <a:buNone/>
-              <a:defRPr sz="2400"/>
+            <a:lvl3pPr marL="720090" indent="0">
+              <a:buNone/>
+              <a:defRPr sz="945"/>
             </a:lvl3pPr>
-            <a:lvl4pPr marL="1371600" indent="0">
-              <a:buNone/>
-              <a:defRPr sz="2000"/>
+            <a:lvl4pPr marL="1080135" indent="0">
+              <a:buNone/>
+              <a:defRPr sz="788"/>
             </a:lvl4pPr>
-            <a:lvl5pPr marL="1828800" indent="0">
-              <a:buNone/>
-              <a:defRPr sz="2000"/>
+            <a:lvl5pPr marL="1440180" indent="0">
+              <a:buNone/>
+              <a:defRPr sz="788"/>
             </a:lvl5pPr>
-            <a:lvl6pPr marL="2286000" indent="0">
-              <a:buNone/>
-              <a:defRPr sz="2000"/>
+            <a:lvl6pPr marL="1800225" indent="0">
+              <a:buNone/>
+              <a:defRPr sz="788"/>
             </a:lvl6pPr>
-            <a:lvl7pPr marL="2743200" indent="0">
-              <a:buNone/>
-              <a:defRPr sz="2000"/>
+            <a:lvl7pPr marL="2160270" indent="0">
+              <a:buNone/>
+              <a:defRPr sz="788"/>
             </a:lvl7pPr>
-            <a:lvl8pPr marL="3200400" indent="0">
-              <a:buNone/>
-              <a:defRPr sz="2000"/>
+            <a:lvl8pPr marL="2520315" indent="0">
+              <a:buNone/>
+              <a:defRPr sz="788"/>
             </a:lvl8pPr>
-            <a:lvl9pPr marL="3657600" indent="0">
-              <a:buNone/>
-              <a:defRPr sz="2000"/>
+            <a:lvl9pPr marL="2880360" indent="0">
+              <a:buNone/>
+              <a:defRPr sz="788"/>
             </a:lvl9pPr>
           </a:lstStyle>
           <a:p>
-            <a:endParaRPr lang="de-DE"/>
-          </a:p>
-        </p:txBody>
-      </p:sp>
-      <p:sp>
-        <p:nvSpPr>
-          <p:cNvPr id="4" name="Textplatzhalter 3">
-            <a:extLst>
-              <a:ext uri="{FF2B5EF4-FFF2-40B4-BE49-F238E27FC236}">
-                <a16:creationId xmlns:a16="http://schemas.microsoft.com/office/drawing/2014/main" id="{DB61F727-44E9-8C42-9AD9-96E104E28242}"/>
-              </a:ext>
-            </a:extLst>
-          </p:cNvPr>
-          <p:cNvSpPr>
-            <a:spLocks noGrp="1"/>
-          </p:cNvSpPr>
-          <p:nvPr>
-            <p:ph type="body" sz="half" idx="2"/>
-          </p:nvPr>
-        </p:nvSpPr>
-        <p:spPr>
-          <a:xfrm>
-            <a:off x="839788" y="2057400"/>
-            <a:ext cx="3932237" cy="3811588"/>
-          </a:xfrm>
-        </p:spPr>
-        <p:txBody>
-          <a:bodyPr/>
-          <a:lstStyle>
-            <a:lvl1pPr marL="0" indent="0">
-              <a:buNone/>
-              <a:defRPr sz="1600"/>
-            </a:lvl1pPr>
-            <a:lvl2pPr marL="457200" indent="0">
-              <a:buNone/>
-              <a:defRPr sz="1400"/>
-            </a:lvl2pPr>
-            <a:lvl3pPr marL="914400" indent="0">
-              <a:buNone/>
-              <a:defRPr sz="1200"/>
-            </a:lvl3pPr>
-            <a:lvl4pPr marL="1371600" indent="0">
-              <a:buNone/>
-              <a:defRPr sz="1000"/>
-            </a:lvl4pPr>
-            <a:lvl5pPr marL="1828800" indent="0">
-              <a:buNone/>
-              <a:defRPr sz="1000"/>
-            </a:lvl5pPr>
-            <a:lvl6pPr marL="2286000" indent="0">
-              <a:buNone/>
-              <a:defRPr sz="1000"/>
-            </a:lvl6pPr>
-            <a:lvl7pPr marL="2743200" indent="0">
-              <a:buNone/>
-              <a:defRPr sz="1000"/>
-            </a:lvl7pPr>
-            <a:lvl8pPr marL="3200400" indent="0">
-              <a:buNone/>
-              <a:defRPr sz="1000"/>
-            </a:lvl8pPr>
-            <a:lvl9pPr marL="3657600" indent="0">
-              <a:buNone/>
-              <a:defRPr sz="1000"/>
-            </a:lvl9pPr>
-          </a:lstStyle>
-          <a:p>
             <a:pPr lvl="0"/>
             <a:r>
               <a:rPr lang="de-DE"/>
@@ -2642,13 +2340,7 @@
       </p:sp>
       <p:sp>
         <p:nvSpPr>
-          <p:cNvPr id="5" name="Datumsplatzhalter 4">
-            <a:extLst>
-              <a:ext uri="{FF2B5EF4-FFF2-40B4-BE49-F238E27FC236}">
-                <a16:creationId xmlns:a16="http://schemas.microsoft.com/office/drawing/2014/main" id="{1C24C773-A4B0-CA46-A1E0-D50E9CA4325A}"/>
-              </a:ext>
-            </a:extLst>
-          </p:cNvPr>
+          <p:cNvPr id="5" name="Date Placeholder 4"/>
           <p:cNvSpPr>
             <a:spLocks noGrp="1"/>
           </p:cNvSpPr>
@@ -2663,7 +2355,7 @@
           <a:p>
             <a:fld id="{1707C51D-322A-654B-9655-3C83443E7C31}" type="datetimeFigureOut">
               <a:rPr lang="de-DE" smtClean="0"/>
-              <a:t>14.11.21</a:t>
+              <a:t>08.12.21</a:t>
             </a:fld>
             <a:endParaRPr lang="de-DE"/>
           </a:p>
@@ -2671,13 +2363,7 @@
       </p:sp>
       <p:sp>
         <p:nvSpPr>
-          <p:cNvPr id="6" name="Fußzeilenplatzhalter 5">
-            <a:extLst>
-              <a:ext uri="{FF2B5EF4-FFF2-40B4-BE49-F238E27FC236}">
-                <a16:creationId xmlns:a16="http://schemas.microsoft.com/office/drawing/2014/main" id="{9D5C189E-382B-9B47-8683-55F84CDD25F1}"/>
-              </a:ext>
-            </a:extLst>
-          </p:cNvPr>
+          <p:cNvPr id="6" name="Footer Placeholder 5"/>
           <p:cNvSpPr>
             <a:spLocks noGrp="1"/>
           </p:cNvSpPr>
@@ -2696,13 +2382,7 @@
       </p:sp>
       <p:sp>
         <p:nvSpPr>
-          <p:cNvPr id="7" name="Foliennummernplatzhalter 6">
-            <a:extLst>
-              <a:ext uri="{FF2B5EF4-FFF2-40B4-BE49-F238E27FC236}">
-                <a16:creationId xmlns:a16="http://schemas.microsoft.com/office/drawing/2014/main" id="{6B189950-F858-6642-807F-B838961C3C3E}"/>
-              </a:ext>
-            </a:extLst>
-          </p:cNvPr>
+          <p:cNvPr id="7" name="Slide Number Placeholder 6"/>
           <p:cNvSpPr>
             <a:spLocks noGrp="1"/>
           </p:cNvSpPr>
@@ -2726,7 +2406,7 @@
     </p:spTree>
     <p:extLst>
       <p:ext uri="{BB962C8B-B14F-4D97-AF65-F5344CB8AC3E}">
-        <p14:creationId xmlns:p14="http://schemas.microsoft.com/office/powerpoint/2010/main" val="4115091203"/>
+        <p14:creationId xmlns:p14="http://schemas.microsoft.com/office/powerpoint/2010/main" val="279641003"/>
       </p:ext>
     </p:extLst>
   </p:cSld>
@@ -2760,13 +2440,7 @@
       </p:grpSpPr>
       <p:sp>
         <p:nvSpPr>
-          <p:cNvPr id="2" name="Titelplatzhalter 1">
-            <a:extLst>
-              <a:ext uri="{FF2B5EF4-FFF2-40B4-BE49-F238E27FC236}">
-                <a16:creationId xmlns:a16="http://schemas.microsoft.com/office/drawing/2014/main" id="{318C9F46-D4D7-0543-9462-F0E8D7287911}"/>
-              </a:ext>
-            </a:extLst>
-          </p:cNvPr>
+          <p:cNvPr id="2" name="Title Placeholder 1"/>
           <p:cNvSpPr>
             <a:spLocks noGrp="1"/>
           </p:cNvSpPr>
@@ -2776,8 +2450,8 @@
         </p:nvSpPr>
         <p:spPr>
           <a:xfrm>
-            <a:off x="838200" y="365125"/>
-            <a:ext cx="10515600" cy="1325563"/>
+            <a:off x="838200" y="287536"/>
+            <a:ext cx="10515600" cy="1043881"/>
           </a:xfrm>
           <a:prstGeom prst="rect">
             <a:avLst/>
@@ -2793,18 +2467,13 @@
               <a:rPr lang="de-DE"/>
               <a:t>Mastertitelformat bearbeiten</a:t>
             </a:r>
-          </a:p>
-        </p:txBody>
-      </p:sp>
-      <p:sp>
-        <p:nvSpPr>
-          <p:cNvPr id="3" name="Textplatzhalter 2">
-            <a:extLst>
-              <a:ext uri="{FF2B5EF4-FFF2-40B4-BE49-F238E27FC236}">
-                <a16:creationId xmlns:a16="http://schemas.microsoft.com/office/drawing/2014/main" id="{7A6CAC15-C83B-2948-B6FF-DA822C192B98}"/>
-              </a:ext>
-            </a:extLst>
-          </p:cNvPr>
+            <a:endParaRPr lang="en-US" dirty="0"/>
+          </a:p>
+        </p:txBody>
+      </p:sp>
+      <p:sp>
+        <p:nvSpPr>
+          <p:cNvPr id="3" name="Text Placeholder 2"/>
           <p:cNvSpPr>
             <a:spLocks noGrp="1"/>
           </p:cNvSpPr>
@@ -2814,8 +2483,8 @@
         </p:nvSpPr>
         <p:spPr>
           <a:xfrm>
-            <a:off x="838200" y="1825625"/>
-            <a:ext cx="10515600" cy="4351338"/>
+            <a:off x="838200" y="1437680"/>
+            <a:ext cx="10515600" cy="3426679"/>
           </a:xfrm>
           <a:prstGeom prst="rect">
             <a:avLst/>
@@ -2860,18 +2529,13 @@
               <a:rPr lang="de-DE"/>
               <a:t>Fünfte Ebene</a:t>
             </a:r>
-          </a:p>
-        </p:txBody>
-      </p:sp>
-      <p:sp>
-        <p:nvSpPr>
-          <p:cNvPr id="4" name="Datumsplatzhalter 3">
-            <a:extLst>
-              <a:ext uri="{FF2B5EF4-FFF2-40B4-BE49-F238E27FC236}">
-                <a16:creationId xmlns:a16="http://schemas.microsoft.com/office/drawing/2014/main" id="{113092D4-0CD4-7E49-B02C-0721606A60A0}"/>
-              </a:ext>
-            </a:extLst>
-          </p:cNvPr>
+            <a:endParaRPr lang="en-US" dirty="0"/>
+          </a:p>
+        </p:txBody>
+      </p:sp>
+      <p:sp>
+        <p:nvSpPr>
+          <p:cNvPr id="4" name="Date Placeholder 3"/>
           <p:cNvSpPr>
             <a:spLocks noGrp="1"/>
           </p:cNvSpPr>
@@ -2881,8 +2545,8 @@
         </p:nvSpPr>
         <p:spPr>
           <a:xfrm>
-            <a:off x="838200" y="6356350"/>
-            <a:ext cx="2743200" cy="365125"/>
+            <a:off x="838200" y="5005626"/>
+            <a:ext cx="2743200" cy="287536"/>
           </a:xfrm>
           <a:prstGeom prst="rect">
             <a:avLst/>
@@ -2892,7 +2556,7 @@
           <a:bodyPr vert="horz" lIns="91440" tIns="45720" rIns="91440" bIns="45720" rtlCol="0" anchor="ctr"/>
           <a:lstStyle>
             <a:lvl1pPr algn="l">
-              <a:defRPr sz="1200">
+              <a:defRPr sz="945">
                 <a:solidFill>
                   <a:schemeClr val="tx1">
                     <a:tint val="75000"/>
@@ -2904,7 +2568,7 @@
           <a:p>
             <a:fld id="{1707C51D-322A-654B-9655-3C83443E7C31}" type="datetimeFigureOut">
               <a:rPr lang="de-DE" smtClean="0"/>
-              <a:t>14.11.21</a:t>
+              <a:t>08.12.21</a:t>
             </a:fld>
             <a:endParaRPr lang="de-DE"/>
           </a:p>
@@ -2912,13 +2576,7 @@
       </p:sp>
       <p:sp>
         <p:nvSpPr>
-          <p:cNvPr id="5" name="Fußzeilenplatzhalter 4">
-            <a:extLst>
-              <a:ext uri="{FF2B5EF4-FFF2-40B4-BE49-F238E27FC236}">
-                <a16:creationId xmlns:a16="http://schemas.microsoft.com/office/drawing/2014/main" id="{23041356-E95C-5846-9325-7C203694B19F}"/>
-              </a:ext>
-            </a:extLst>
-          </p:cNvPr>
+          <p:cNvPr id="5" name="Footer Placeholder 4"/>
           <p:cNvSpPr>
             <a:spLocks noGrp="1"/>
           </p:cNvSpPr>
@@ -2928,8 +2586,8 @@
         </p:nvSpPr>
         <p:spPr>
           <a:xfrm>
-            <a:off x="4038600" y="6356350"/>
-            <a:ext cx="4114800" cy="365125"/>
+            <a:off x="4038600" y="5005626"/>
+            <a:ext cx="4114800" cy="287536"/>
           </a:xfrm>
           <a:prstGeom prst="rect">
             <a:avLst/>
@@ -2939,7 +2597,7 @@
           <a:bodyPr vert="horz" lIns="91440" tIns="45720" rIns="91440" bIns="45720" rtlCol="0" anchor="ctr"/>
           <a:lstStyle>
             <a:lvl1pPr algn="ctr">
-              <a:defRPr sz="1200">
+              <a:defRPr sz="945">
                 <a:solidFill>
                   <a:schemeClr val="tx1">
                     <a:tint val="75000"/>
@@ -2955,13 +2613,7 @@
       </p:sp>
       <p:sp>
         <p:nvSpPr>
-          <p:cNvPr id="6" name="Foliennummernplatzhalter 5">
-            <a:extLst>
-              <a:ext uri="{FF2B5EF4-FFF2-40B4-BE49-F238E27FC236}">
-                <a16:creationId xmlns:a16="http://schemas.microsoft.com/office/drawing/2014/main" id="{D5506B31-5BD9-3E49-9982-CF074BEA548D}"/>
-              </a:ext>
-            </a:extLst>
-          </p:cNvPr>
+          <p:cNvPr id="6" name="Slide Number Placeholder 5"/>
           <p:cNvSpPr>
             <a:spLocks noGrp="1"/>
           </p:cNvSpPr>
@@ -2971,8 +2623,8 @@
         </p:nvSpPr>
         <p:spPr>
           <a:xfrm>
-            <a:off x="8610600" y="6356350"/>
-            <a:ext cx="2743200" cy="365125"/>
+            <a:off x="8610600" y="5005626"/>
+            <a:ext cx="2743200" cy="287536"/>
           </a:xfrm>
           <a:prstGeom prst="rect">
             <a:avLst/>
@@ -2982,7 +2634,7 @@
           <a:bodyPr vert="horz" lIns="91440" tIns="45720" rIns="91440" bIns="45720" rtlCol="0" anchor="ctr"/>
           <a:lstStyle>
             <a:lvl1pPr algn="r">
-              <a:defRPr sz="1200">
+              <a:defRPr sz="945">
                 <a:solidFill>
                   <a:schemeClr val="tx1">
                     <a:tint val="75000"/>
@@ -3003,27 +2655,27 @@
     </p:spTree>
     <p:extLst>
       <p:ext uri="{BB962C8B-B14F-4D97-AF65-F5344CB8AC3E}">
-        <p14:creationId xmlns:p14="http://schemas.microsoft.com/office/powerpoint/2010/main" val="4022199430"/>
+        <p14:creationId xmlns:p14="http://schemas.microsoft.com/office/powerpoint/2010/main" val="3088052446"/>
       </p:ext>
     </p:extLst>
   </p:cSld>
   <p:clrMap bg1="lt1" tx1="dk1" bg2="lt2" tx2="dk2" accent1="accent1" accent2="accent2" accent3="accent3" accent4="accent4" accent5="accent5" accent6="accent6" hlink="hlink" folHlink="folHlink"/>
   <p:sldLayoutIdLst>
-    <p:sldLayoutId id="2147483649" r:id="rId1"/>
-    <p:sldLayoutId id="2147483650" r:id="rId2"/>
-    <p:sldLayoutId id="2147483651" r:id="rId3"/>
-    <p:sldLayoutId id="2147483652" r:id="rId4"/>
-    <p:sldLayoutId id="2147483653" r:id="rId5"/>
-    <p:sldLayoutId id="2147483654" r:id="rId6"/>
-    <p:sldLayoutId id="2147483655" r:id="rId7"/>
-    <p:sldLayoutId id="2147483656" r:id="rId8"/>
-    <p:sldLayoutId id="2147483657" r:id="rId9"/>
-    <p:sldLayoutId id="2147483658" r:id="rId10"/>
-    <p:sldLayoutId id="2147483659" r:id="rId11"/>
+    <p:sldLayoutId id="2147483661" r:id="rId1"/>
+    <p:sldLayoutId id="2147483662" r:id="rId2"/>
+    <p:sldLayoutId id="2147483663" r:id="rId3"/>
+    <p:sldLayoutId id="2147483664" r:id="rId4"/>
+    <p:sldLayoutId id="2147483665" r:id="rId5"/>
+    <p:sldLayoutId id="2147483666" r:id="rId6"/>
+    <p:sldLayoutId id="2147483667" r:id="rId7"/>
+    <p:sldLayoutId id="2147483668" r:id="rId8"/>
+    <p:sldLayoutId id="2147483669" r:id="rId9"/>
+    <p:sldLayoutId id="2147483670" r:id="rId10"/>
+    <p:sldLayoutId id="2147483671" r:id="rId11"/>
   </p:sldLayoutIdLst>
   <p:txStyles>
     <p:titleStyle>
-      <a:lvl1pPr algn="l" defTabSz="914400" rtl="0" eaLnBrk="1" latinLnBrk="0" hangingPunct="1">
+      <a:lvl1pPr algn="l" defTabSz="720090" rtl="0" eaLnBrk="1" latinLnBrk="0" hangingPunct="1">
         <a:lnSpc>
           <a:spcPct val="90000"/>
         </a:lnSpc>
@@ -3031,7 +2683,7 @@
           <a:spcPct val="0"/>
         </a:spcBef>
         <a:buNone/>
-        <a:defRPr sz="4400" kern="1200">
+        <a:defRPr sz="3465" kern="1200">
           <a:solidFill>
             <a:schemeClr val="tx1"/>
           </a:solidFill>
@@ -3042,16 +2694,16 @@
       </a:lvl1pPr>
     </p:titleStyle>
     <p:bodyStyle>
-      <a:lvl1pPr marL="228600" indent="-228600" algn="l" defTabSz="914400" rtl="0" eaLnBrk="1" latinLnBrk="0" hangingPunct="1">
+      <a:lvl1pPr marL="180023" indent="-180023" algn="l" defTabSz="720090" rtl="0" eaLnBrk="1" latinLnBrk="0" hangingPunct="1">
         <a:lnSpc>
           <a:spcPct val="90000"/>
         </a:lnSpc>
         <a:spcBef>
-          <a:spcPts val="1000"/>
+          <a:spcPts val="788"/>
         </a:spcBef>
         <a:buFont typeface="Arial" panose="020B0604020202020204" pitchFamily="34" charset="0"/>
         <a:buChar char="•"/>
-        <a:defRPr sz="2800" kern="1200">
+        <a:defRPr sz="2205" kern="1200">
           <a:solidFill>
             <a:schemeClr val="tx1"/>
           </a:solidFill>
@@ -3060,16 +2712,16 @@
           <a:cs typeface="+mn-cs"/>
         </a:defRPr>
       </a:lvl1pPr>
-      <a:lvl2pPr marL="685800" indent="-228600" algn="l" defTabSz="914400" rtl="0" eaLnBrk="1" latinLnBrk="0" hangingPunct="1">
+      <a:lvl2pPr marL="540068" indent="-180023" algn="l" defTabSz="720090" rtl="0" eaLnBrk="1" latinLnBrk="0" hangingPunct="1">
         <a:lnSpc>
           <a:spcPct val="90000"/>
         </a:lnSpc>
         <a:spcBef>
-          <a:spcPts val="500"/>
+          <a:spcPts val="394"/>
         </a:spcBef>
         <a:buFont typeface="Arial" panose="020B0604020202020204" pitchFamily="34" charset="0"/>
         <a:buChar char="•"/>
-        <a:defRPr sz="2400" kern="1200">
+        <a:defRPr sz="1890" kern="1200">
           <a:solidFill>
             <a:schemeClr val="tx1"/>
           </a:solidFill>
@@ -3078,16 +2730,16 @@
           <a:cs typeface="+mn-cs"/>
         </a:defRPr>
       </a:lvl2pPr>
-      <a:lvl3pPr marL="1143000" indent="-228600" algn="l" defTabSz="914400" rtl="0" eaLnBrk="1" latinLnBrk="0" hangingPunct="1">
+      <a:lvl3pPr marL="900113" indent="-180023" algn="l" defTabSz="720090" rtl="0" eaLnBrk="1" latinLnBrk="0" hangingPunct="1">
         <a:lnSpc>
           <a:spcPct val="90000"/>
         </a:lnSpc>
         <a:spcBef>
-          <a:spcPts val="500"/>
+          <a:spcPts val="394"/>
         </a:spcBef>
         <a:buFont typeface="Arial" panose="020B0604020202020204" pitchFamily="34" charset="0"/>
         <a:buChar char="•"/>
-        <a:defRPr sz="2000" kern="1200">
+        <a:defRPr sz="1575" kern="1200">
           <a:solidFill>
             <a:schemeClr val="tx1"/>
           </a:solidFill>
@@ -3096,16 +2748,16 @@
           <a:cs typeface="+mn-cs"/>
         </a:defRPr>
       </a:lvl3pPr>
-      <a:lvl4pPr marL="1600200" indent="-228600" algn="l" defTabSz="914400" rtl="0" eaLnBrk="1" latinLnBrk="0" hangingPunct="1">
+      <a:lvl4pPr marL="1260158" indent="-180023" algn="l" defTabSz="720090" rtl="0" eaLnBrk="1" latinLnBrk="0" hangingPunct="1">
         <a:lnSpc>
           <a:spcPct val="90000"/>
         </a:lnSpc>
         <a:spcBef>
-          <a:spcPts val="500"/>
+          <a:spcPts val="394"/>
         </a:spcBef>
         <a:buFont typeface="Arial" panose="020B0604020202020204" pitchFamily="34" charset="0"/>
         <a:buChar char="•"/>
-        <a:defRPr sz="1800" kern="1200">
+        <a:defRPr sz="1418" kern="1200">
           <a:solidFill>
             <a:schemeClr val="tx1"/>
           </a:solidFill>
@@ -3114,16 +2766,16 @@
           <a:cs typeface="+mn-cs"/>
         </a:defRPr>
       </a:lvl4pPr>
-      <a:lvl5pPr marL="2057400" indent="-228600" algn="l" defTabSz="914400" rtl="0" eaLnBrk="1" latinLnBrk="0" hangingPunct="1">
+      <a:lvl5pPr marL="1620203" indent="-180023" algn="l" defTabSz="720090" rtl="0" eaLnBrk="1" latinLnBrk="0" hangingPunct="1">
         <a:lnSpc>
           <a:spcPct val="90000"/>
         </a:lnSpc>
         <a:spcBef>
-          <a:spcPts val="500"/>
+          <a:spcPts val="394"/>
         </a:spcBef>
         <a:buFont typeface="Arial" panose="020B0604020202020204" pitchFamily="34" charset="0"/>
         <a:buChar char="•"/>
-        <a:defRPr sz="1800" kern="1200">
+        <a:defRPr sz="1418" kern="1200">
           <a:solidFill>
             <a:schemeClr val="tx1"/>
           </a:solidFill>
@@ -3132,16 +2784,16 @@
           <a:cs typeface="+mn-cs"/>
         </a:defRPr>
       </a:lvl5pPr>
-      <a:lvl6pPr marL="2514600" indent="-228600" algn="l" defTabSz="914400" rtl="0" eaLnBrk="1" latinLnBrk="0" hangingPunct="1">
+      <a:lvl6pPr marL="1980248" indent="-180023" algn="l" defTabSz="720090" rtl="0" eaLnBrk="1" latinLnBrk="0" hangingPunct="1">
         <a:lnSpc>
           <a:spcPct val="90000"/>
         </a:lnSpc>
         <a:spcBef>
-          <a:spcPts val="500"/>
+          <a:spcPts val="394"/>
         </a:spcBef>
         <a:buFont typeface="Arial" panose="020B0604020202020204" pitchFamily="34" charset="0"/>
         <a:buChar char="•"/>
-        <a:defRPr sz="1800" kern="1200">
+        <a:defRPr sz="1418" kern="1200">
           <a:solidFill>
             <a:schemeClr val="tx1"/>
           </a:solidFill>
@@ -3150,16 +2802,16 @@
           <a:cs typeface="+mn-cs"/>
         </a:defRPr>
       </a:lvl6pPr>
-      <a:lvl7pPr marL="2971800" indent="-228600" algn="l" defTabSz="914400" rtl="0" eaLnBrk="1" latinLnBrk="0" hangingPunct="1">
+      <a:lvl7pPr marL="2340293" indent="-180023" algn="l" defTabSz="720090" rtl="0" eaLnBrk="1" latinLnBrk="0" hangingPunct="1">
         <a:lnSpc>
           <a:spcPct val="90000"/>
         </a:lnSpc>
         <a:spcBef>
-          <a:spcPts val="500"/>
+          <a:spcPts val="394"/>
         </a:spcBef>
         <a:buFont typeface="Arial" panose="020B0604020202020204" pitchFamily="34" charset="0"/>
         <a:buChar char="•"/>
-        <a:defRPr sz="1800" kern="1200">
+        <a:defRPr sz="1418" kern="1200">
           <a:solidFill>
             <a:schemeClr val="tx1"/>
           </a:solidFill>
@@ -3168,16 +2820,16 @@
           <a:cs typeface="+mn-cs"/>
         </a:defRPr>
       </a:lvl7pPr>
-      <a:lvl8pPr marL="3429000" indent="-228600" algn="l" defTabSz="914400" rtl="0" eaLnBrk="1" latinLnBrk="0" hangingPunct="1">
+      <a:lvl8pPr marL="2700338" indent="-180023" algn="l" defTabSz="720090" rtl="0" eaLnBrk="1" latinLnBrk="0" hangingPunct="1">
         <a:lnSpc>
           <a:spcPct val="90000"/>
         </a:lnSpc>
         <a:spcBef>
-          <a:spcPts val="500"/>
+          <a:spcPts val="394"/>
         </a:spcBef>
         <a:buFont typeface="Arial" panose="020B0604020202020204" pitchFamily="34" charset="0"/>
         <a:buChar char="•"/>
-        <a:defRPr sz="1800" kern="1200">
+        <a:defRPr sz="1418" kern="1200">
           <a:solidFill>
             <a:schemeClr val="tx1"/>
           </a:solidFill>
@@ -3186,16 +2838,16 @@
           <a:cs typeface="+mn-cs"/>
         </a:defRPr>
       </a:lvl8pPr>
-      <a:lvl9pPr marL="3886200" indent="-228600" algn="l" defTabSz="914400" rtl="0" eaLnBrk="1" latinLnBrk="0" hangingPunct="1">
+      <a:lvl9pPr marL="3060383" indent="-180023" algn="l" defTabSz="720090" rtl="0" eaLnBrk="1" latinLnBrk="0" hangingPunct="1">
         <a:lnSpc>
           <a:spcPct val="90000"/>
         </a:lnSpc>
         <a:spcBef>
-          <a:spcPts val="500"/>
+          <a:spcPts val="394"/>
         </a:spcBef>
         <a:buFont typeface="Arial" panose="020B0604020202020204" pitchFamily="34" charset="0"/>
         <a:buChar char="•"/>
-        <a:defRPr sz="1800" kern="1200">
+        <a:defRPr sz="1418" kern="1200">
           <a:solidFill>
             <a:schemeClr val="tx1"/>
           </a:solidFill>
@@ -3207,10 +2859,10 @@
     </p:bodyStyle>
     <p:otherStyle>
       <a:defPPr>
-        <a:defRPr lang="de-DE"/>
+        <a:defRPr lang="en-US"/>
       </a:defPPr>
-      <a:lvl1pPr marL="0" algn="l" defTabSz="914400" rtl="0" eaLnBrk="1" latinLnBrk="0" hangingPunct="1">
-        <a:defRPr sz="1800" kern="1200">
+      <a:lvl1pPr marL="0" algn="l" defTabSz="720090" rtl="0" eaLnBrk="1" latinLnBrk="0" hangingPunct="1">
+        <a:defRPr sz="1418" kern="1200">
           <a:solidFill>
             <a:schemeClr val="tx1"/>
           </a:solidFill>
@@ -3219,8 +2871,8 @@
           <a:cs typeface="+mn-cs"/>
         </a:defRPr>
       </a:lvl1pPr>
-      <a:lvl2pPr marL="457200" algn="l" defTabSz="914400" rtl="0" eaLnBrk="1" latinLnBrk="0" hangingPunct="1">
-        <a:defRPr sz="1800" kern="1200">
+      <a:lvl2pPr marL="360045" algn="l" defTabSz="720090" rtl="0" eaLnBrk="1" latinLnBrk="0" hangingPunct="1">
+        <a:defRPr sz="1418" kern="1200">
           <a:solidFill>
             <a:schemeClr val="tx1"/>
           </a:solidFill>
@@ -3229,8 +2881,8 @@
           <a:cs typeface="+mn-cs"/>
         </a:defRPr>
       </a:lvl2pPr>
-      <a:lvl3pPr marL="914400" algn="l" defTabSz="914400" rtl="0" eaLnBrk="1" latinLnBrk="0" hangingPunct="1">
-        <a:defRPr sz="1800" kern="1200">
+      <a:lvl3pPr marL="720090" algn="l" defTabSz="720090" rtl="0" eaLnBrk="1" latinLnBrk="0" hangingPunct="1">
+        <a:defRPr sz="1418" kern="1200">
           <a:solidFill>
             <a:schemeClr val="tx1"/>
           </a:solidFill>
@@ -3239,8 +2891,8 @@
           <a:cs typeface="+mn-cs"/>
         </a:defRPr>
       </a:lvl3pPr>
-      <a:lvl4pPr marL="1371600" algn="l" defTabSz="914400" rtl="0" eaLnBrk="1" latinLnBrk="0" hangingPunct="1">
-        <a:defRPr sz="1800" kern="1200">
+      <a:lvl4pPr marL="1080135" algn="l" defTabSz="720090" rtl="0" eaLnBrk="1" latinLnBrk="0" hangingPunct="1">
+        <a:defRPr sz="1418" kern="1200">
           <a:solidFill>
             <a:schemeClr val="tx1"/>
           </a:solidFill>
@@ -3249,8 +2901,8 @@
           <a:cs typeface="+mn-cs"/>
         </a:defRPr>
       </a:lvl4pPr>
-      <a:lvl5pPr marL="1828800" algn="l" defTabSz="914400" rtl="0" eaLnBrk="1" latinLnBrk="0" hangingPunct="1">
-        <a:defRPr sz="1800" kern="1200">
+      <a:lvl5pPr marL="1440180" algn="l" defTabSz="720090" rtl="0" eaLnBrk="1" latinLnBrk="0" hangingPunct="1">
+        <a:defRPr sz="1418" kern="1200">
           <a:solidFill>
             <a:schemeClr val="tx1"/>
           </a:solidFill>
@@ -3259,8 +2911,8 @@
           <a:cs typeface="+mn-cs"/>
         </a:defRPr>
       </a:lvl5pPr>
-      <a:lvl6pPr marL="2286000" algn="l" defTabSz="914400" rtl="0" eaLnBrk="1" latinLnBrk="0" hangingPunct="1">
-        <a:defRPr sz="1800" kern="1200">
+      <a:lvl6pPr marL="1800225" algn="l" defTabSz="720090" rtl="0" eaLnBrk="1" latinLnBrk="0" hangingPunct="1">
+        <a:defRPr sz="1418" kern="1200">
           <a:solidFill>
             <a:schemeClr val="tx1"/>
           </a:solidFill>
@@ -3269,8 +2921,8 @@
           <a:cs typeface="+mn-cs"/>
         </a:defRPr>
       </a:lvl6pPr>
-      <a:lvl7pPr marL="2743200" algn="l" defTabSz="914400" rtl="0" eaLnBrk="1" latinLnBrk="0" hangingPunct="1">
-        <a:defRPr sz="1800" kern="1200">
+      <a:lvl7pPr marL="2160270" algn="l" defTabSz="720090" rtl="0" eaLnBrk="1" latinLnBrk="0" hangingPunct="1">
+        <a:defRPr sz="1418" kern="1200">
           <a:solidFill>
             <a:schemeClr val="tx1"/>
           </a:solidFill>
@@ -3279,8 +2931,8 @@
           <a:cs typeface="+mn-cs"/>
         </a:defRPr>
       </a:lvl7pPr>
-      <a:lvl8pPr marL="3200400" algn="l" defTabSz="914400" rtl="0" eaLnBrk="1" latinLnBrk="0" hangingPunct="1">
-        <a:defRPr sz="1800" kern="1200">
+      <a:lvl8pPr marL="2520315" algn="l" defTabSz="720090" rtl="0" eaLnBrk="1" latinLnBrk="0" hangingPunct="1">
+        <a:defRPr sz="1418" kern="1200">
           <a:solidFill>
             <a:schemeClr val="tx1"/>
           </a:solidFill>
@@ -3289,8 +2941,8 @@
           <a:cs typeface="+mn-cs"/>
         </a:defRPr>
       </a:lvl8pPr>
-      <a:lvl9pPr marL="3657600" algn="l" defTabSz="914400" rtl="0" eaLnBrk="1" latinLnBrk="0" hangingPunct="1">
-        <a:defRPr sz="1800" kern="1200">
+      <a:lvl9pPr marL="2880360" algn="l" defTabSz="720090" rtl="0" eaLnBrk="1" latinLnBrk="0" hangingPunct="1">
+        <a:defRPr sz="1418" kern="1200">
           <a:solidFill>
             <a:schemeClr val="tx1"/>
           </a:solidFill>
@@ -3335,8 +2987,8 @@
         </p:nvSpPr>
         <p:spPr>
           <a:xfrm>
-            <a:off x="443218" y="3875820"/>
-            <a:ext cx="2491530" cy="1233183"/>
+            <a:off x="340573" y="3669518"/>
+            <a:ext cx="1954293" cy="1233183"/>
           </a:xfrm>
           <a:prstGeom prst="rect">
             <a:avLst/>
@@ -3391,7 +3043,7 @@
         </p:nvSpPr>
         <p:spPr>
           <a:xfrm>
-            <a:off x="3649211" y="3875820"/>
+            <a:off x="3293053" y="3682962"/>
             <a:ext cx="2828488" cy="1233183"/>
           </a:xfrm>
           <a:prstGeom prst="rect">
@@ -3447,8 +3099,8 @@
         </p:nvSpPr>
         <p:spPr>
           <a:xfrm>
-            <a:off x="897692" y="3929819"/>
-            <a:ext cx="1534779" cy="369332"/>
+            <a:off x="340573" y="3678014"/>
+            <a:ext cx="2189621" cy="369332"/>
           </a:xfrm>
           <a:prstGeom prst="rect">
             <a:avLst/>
@@ -3456,14 +3108,14 @@
           <a:noFill/>
         </p:spPr>
         <p:txBody>
-          <a:bodyPr wrap="none" rtlCol="0">
+          <a:bodyPr wrap="square" rtlCol="0">
             <a:spAutoFit/>
           </a:bodyPr>
           <a:lstStyle/>
           <a:p>
             <a:r>
               <a:rPr lang="de-DE" b="1" dirty="0"/>
-              <a:t>Li-Ion Batterie</a:t>
+              <a:t>G1 (Li-Ion Batterie)</a:t>
             </a:r>
           </a:p>
         </p:txBody>
@@ -3482,8 +3134,8 @@
         </p:nvSpPr>
         <p:spPr>
           <a:xfrm>
-            <a:off x="4429387" y="3875820"/>
-            <a:ext cx="1875898" cy="369332"/>
+            <a:off x="4014547" y="3678014"/>
+            <a:ext cx="1382494" cy="369332"/>
           </a:xfrm>
           <a:prstGeom prst="rect">
             <a:avLst/>
@@ -3497,12 +3149,16 @@
           <a:lstStyle/>
           <a:p>
             <a:r>
+              <a:rPr lang="de-DE" b="1" dirty="0"/>
+              <a:t>T3 (</a:t>
+            </a:r>
+            <a:r>
               <a:rPr lang="de-DE" b="1" dirty="0" err="1"/>
               <a:t>Step-Up</a:t>
             </a:r>
             <a:r>
               <a:rPr lang="de-DE" b="1" dirty="0"/>
-              <a:t> Wandler </a:t>
+              <a:t>)</a:t>
             </a:r>
           </a:p>
         </p:txBody>
@@ -3521,7 +3177,7 @@
         </p:nvSpPr>
         <p:spPr>
           <a:xfrm>
-            <a:off x="3698061" y="4136256"/>
+            <a:off x="3341903" y="3943397"/>
             <a:ext cx="1061398" cy="923330"/>
           </a:xfrm>
           <a:prstGeom prst="rect">
@@ -3565,7 +3221,7 @@
         </p:nvSpPr>
         <p:spPr>
           <a:xfrm>
-            <a:off x="5405229" y="4274754"/>
+            <a:off x="5049071" y="4081896"/>
             <a:ext cx="1061398" cy="646331"/>
           </a:xfrm>
           <a:prstGeom prst="rect">
@@ -3611,7 +3267,7 @@
         </p:nvSpPr>
         <p:spPr>
           <a:xfrm>
-            <a:off x="7209025" y="3929819"/>
+            <a:off x="7656011" y="3788469"/>
             <a:ext cx="2491530" cy="1233183"/>
           </a:xfrm>
           <a:prstGeom prst="rect">
@@ -3667,8 +3323,8 @@
         </p:nvSpPr>
         <p:spPr>
           <a:xfrm>
-            <a:off x="7849962" y="3916423"/>
-            <a:ext cx="1396408" cy="369332"/>
+            <a:off x="7920033" y="3772318"/>
+            <a:ext cx="1963486" cy="369332"/>
           </a:xfrm>
           <a:prstGeom prst="rect">
             <a:avLst/>
@@ -3683,7 +3339,15 @@
           <a:p>
             <a:r>
               <a:rPr lang="de-DE" b="1" dirty="0"/>
-              <a:t>µ-Controller </a:t>
+              <a:t>K1 (</a:t>
+            </a:r>
+            <a:r>
+              <a:rPr lang="de-DE" b="1" dirty="0" err="1"/>
+              <a:t>Steueurungen</a:t>
+            </a:r>
+            <a:r>
+              <a:rPr lang="de-DE" b="1" dirty="0"/>
+              <a:t>)</a:t>
             </a:r>
           </a:p>
         </p:txBody>
@@ -3702,7 +3366,7 @@
         </p:nvSpPr>
         <p:spPr>
           <a:xfrm>
-            <a:off x="3649211" y="2249970"/>
+            <a:off x="3293053" y="2057112"/>
             <a:ext cx="2828488" cy="1233183"/>
           </a:xfrm>
           <a:prstGeom prst="rect">
@@ -3758,8 +3422,8 @@
         </p:nvSpPr>
         <p:spPr>
           <a:xfrm>
-            <a:off x="4143445" y="2190811"/>
-            <a:ext cx="2165593" cy="369332"/>
+            <a:off x="3928303" y="2026158"/>
+            <a:ext cx="1672189" cy="369332"/>
           </a:xfrm>
           <a:prstGeom prst="rect">
             <a:avLst/>
@@ -3773,12 +3437,16 @@
           <a:lstStyle/>
           <a:p>
             <a:r>
+              <a:rPr lang="de-DE" b="1" dirty="0"/>
+              <a:t>T2 (</a:t>
+            </a:r>
+            <a:r>
               <a:rPr lang="de-DE" b="1" dirty="0" err="1"/>
               <a:t>Step</a:t>
             </a:r>
             <a:r>
               <a:rPr lang="de-DE" b="1" dirty="0"/>
-              <a:t>-Down Wandler </a:t>
+              <a:t>-Down)</a:t>
             </a:r>
           </a:p>
         </p:txBody>
@@ -3797,7 +3465,7 @@
         </p:nvSpPr>
         <p:spPr>
           <a:xfrm>
-            <a:off x="3698061" y="2510406"/>
+            <a:off x="3341903" y="2317547"/>
             <a:ext cx="1061398" cy="923330"/>
           </a:xfrm>
           <a:prstGeom prst="rect">
@@ -3841,7 +3509,7 @@
         </p:nvSpPr>
         <p:spPr>
           <a:xfrm>
-            <a:off x="5266803" y="2588538"/>
+            <a:off x="4910645" y="2395680"/>
             <a:ext cx="1202900" cy="646331"/>
           </a:xfrm>
           <a:prstGeom prst="rect">
@@ -3891,7 +3559,7 @@
         </p:nvSpPr>
         <p:spPr>
           <a:xfrm>
-            <a:off x="6964312" y="1474840"/>
+            <a:off x="7663607" y="1303337"/>
             <a:ext cx="1951607" cy="1233183"/>
           </a:xfrm>
           <a:prstGeom prst="rect">
@@ -3947,8 +3615,8 @@
         </p:nvSpPr>
         <p:spPr>
           <a:xfrm>
-            <a:off x="7458546" y="1483660"/>
-            <a:ext cx="857927" cy="369332"/>
+            <a:off x="7935743" y="1243648"/>
+            <a:ext cx="1558440" cy="369332"/>
           </a:xfrm>
           <a:prstGeom prst="rect">
             <a:avLst/>
@@ -3962,10 +3630,9 @@
           <a:lstStyle/>
           <a:p>
             <a:r>
-              <a:rPr lang="de-DE" b="1"/>
-              <a:t>Treiber</a:t>
-            </a:r>
-            <a:endParaRPr lang="de-DE" b="1" dirty="0"/>
+              <a:rPr lang="de-DE" b="1" dirty="0"/>
+              <a:t>T4 (M-Treiber)</a:t>
+            </a:r>
           </a:p>
         </p:txBody>
       </p:sp>
@@ -3983,7 +3650,7 @@
         </p:nvSpPr>
         <p:spPr>
           <a:xfrm>
-            <a:off x="7013162" y="1735276"/>
+            <a:off x="7712457" y="1563772"/>
             <a:ext cx="857927" cy="923330"/>
           </a:xfrm>
           <a:prstGeom prst="rect">
@@ -4027,7 +3694,7 @@
         </p:nvSpPr>
         <p:spPr>
           <a:xfrm>
-            <a:off x="7950457" y="1735276"/>
+            <a:off x="8649751" y="1563772"/>
             <a:ext cx="961692" cy="923330"/>
           </a:xfrm>
           <a:prstGeom prst="rect">
@@ -4077,7 +3744,7 @@
         </p:nvSpPr>
         <p:spPr>
           <a:xfrm>
-            <a:off x="3649211" y="714406"/>
+            <a:off x="3293053" y="521547"/>
             <a:ext cx="2828488" cy="1233183"/>
           </a:xfrm>
           <a:prstGeom prst="rect">
@@ -4133,8 +3800,8 @@
         </p:nvSpPr>
         <p:spPr>
           <a:xfrm>
-            <a:off x="4143445" y="667244"/>
-            <a:ext cx="2165593" cy="369332"/>
+            <a:off x="3916133" y="461158"/>
+            <a:ext cx="1672189" cy="369332"/>
           </a:xfrm>
           <a:prstGeom prst="rect">
             <a:avLst/>
@@ -4148,12 +3815,16 @@
           <a:lstStyle/>
           <a:p>
             <a:r>
+              <a:rPr lang="de-DE" b="1" dirty="0"/>
+              <a:t>T1 (</a:t>
+            </a:r>
+            <a:r>
               <a:rPr lang="de-DE" b="1" dirty="0" err="1"/>
               <a:t>Step</a:t>
             </a:r>
             <a:r>
               <a:rPr lang="de-DE" b="1" dirty="0"/>
-              <a:t>-Down Wandler </a:t>
+              <a:t>-Down)</a:t>
             </a:r>
           </a:p>
         </p:txBody>
@@ -4172,7 +3843,7 @@
         </p:nvSpPr>
         <p:spPr>
           <a:xfrm>
-            <a:off x="3698061" y="974842"/>
+            <a:off x="3341903" y="781983"/>
             <a:ext cx="1061398" cy="923330"/>
           </a:xfrm>
           <a:prstGeom prst="rect">
@@ -4212,7 +3883,7 @@
         </p:nvSpPr>
         <p:spPr>
           <a:xfrm>
-            <a:off x="5322276" y="1072766"/>
+            <a:off x="4966118" y="879908"/>
             <a:ext cx="1155424" cy="646331"/>
           </a:xfrm>
           <a:prstGeom prst="rect">
@@ -4262,8 +3933,8 @@
         </p:nvGrpSpPr>
         <p:grpSpPr>
           <a:xfrm>
-            <a:off x="10445686" y="1665125"/>
-            <a:ext cx="1141964" cy="1113246"/>
+            <a:off x="10960724" y="1577760"/>
+            <a:ext cx="988508" cy="991405"/>
             <a:chOff x="10460597" y="1980827"/>
             <a:chExt cx="1141964" cy="1113246"/>
           </a:xfrm>
@@ -4335,7 +4006,7 @@
           <p:spPr>
             <a:xfrm>
               <a:off x="10832830" y="2134325"/>
-              <a:ext cx="397502" cy="369888"/>
+              <a:ext cx="441112" cy="414722"/>
             </a:xfrm>
             <a:prstGeom prst="rect">
               <a:avLst/>
@@ -4497,7 +4168,7 @@
         </p:nvSpPr>
         <p:spPr>
           <a:xfrm>
-            <a:off x="9246370" y="1864075"/>
+            <a:off x="9846047" y="1703310"/>
             <a:ext cx="1571549" cy="646331"/>
           </a:xfrm>
           <a:prstGeom prst="rect">
@@ -4534,6 +4205,7 @@
             </a:extLst>
           </p:cNvPr>
           <p:cNvCxnSpPr>
+            <a:cxnSpLocks/>
             <a:stCxn id="4" idx="3"/>
             <a:endCxn id="5" idx="1"/>
           </p:cNvCxnSpPr>
@@ -4541,8 +4213,8 @@
         </p:nvCxnSpPr>
         <p:spPr>
           <a:xfrm>
-            <a:off x="2934748" y="4492412"/>
-            <a:ext cx="714463" cy="0"/>
+            <a:off x="2294865" y="4286109"/>
+            <a:ext cx="998188" cy="13444"/>
           </a:xfrm>
           <a:prstGeom prst="line">
             <a:avLst/>
@@ -4584,7 +4256,7 @@
         </p:nvCxnSpPr>
         <p:spPr>
           <a:xfrm flipV="1">
-            <a:off x="3196205" y="1330997"/>
+            <a:off x="2840047" y="1138138"/>
             <a:ext cx="0" cy="3161414"/>
           </a:xfrm>
           <a:prstGeom prst="line">
@@ -4628,7 +4300,7 @@
         </p:nvCxnSpPr>
         <p:spPr>
           <a:xfrm>
-            <a:off x="3196205" y="1330997"/>
+            <a:off x="2840047" y="1138139"/>
             <a:ext cx="453006" cy="1"/>
           </a:xfrm>
           <a:prstGeom prst="line">
@@ -4671,7 +4343,7 @@
         </p:nvCxnSpPr>
         <p:spPr>
           <a:xfrm>
-            <a:off x="3196205" y="2762023"/>
+            <a:off x="2840047" y="2569165"/>
             <a:ext cx="453006" cy="1"/>
           </a:xfrm>
           <a:prstGeom prst="line">
@@ -4712,7 +4384,7 @@
         </p:nvSpPr>
         <p:spPr>
           <a:xfrm>
-            <a:off x="3154977" y="2708023"/>
+            <a:off x="2798819" y="2515164"/>
             <a:ext cx="108000" cy="108000"/>
           </a:xfrm>
           <a:prstGeom prst="ellipse">
@@ -4759,7 +4431,7 @@
         </p:nvSpPr>
         <p:spPr>
           <a:xfrm>
-            <a:off x="3150375" y="4438411"/>
+            <a:off x="2794217" y="4245552"/>
             <a:ext cx="108000" cy="108000"/>
           </a:xfrm>
           <a:prstGeom prst="ellipse">
@@ -4808,7 +4480,7 @@
         </p:nvCxnSpPr>
         <p:spPr>
           <a:xfrm>
-            <a:off x="6477698" y="2843489"/>
+            <a:off x="6121541" y="2650630"/>
             <a:ext cx="262081" cy="0"/>
           </a:xfrm>
           <a:prstGeom prst="line">
@@ -4851,7 +4523,7 @@
         </p:nvCxnSpPr>
         <p:spPr>
           <a:xfrm>
-            <a:off x="6477698" y="1307925"/>
+            <a:off x="6121541" y="1115067"/>
             <a:ext cx="262081" cy="1"/>
           </a:xfrm>
           <a:prstGeom prst="line">
@@ -4892,7 +4564,7 @@
         </p:nvSpPr>
         <p:spPr>
           <a:xfrm>
-            <a:off x="6685779" y="2044778"/>
+            <a:off x="6329621" y="1851919"/>
             <a:ext cx="108000" cy="108000"/>
           </a:xfrm>
           <a:prstGeom prst="ellipse">
@@ -4941,7 +4613,7 @@
         </p:nvCxnSpPr>
         <p:spPr>
           <a:xfrm flipV="1">
-            <a:off x="6739779" y="1304863"/>
+            <a:off x="6383621" y="1112004"/>
             <a:ext cx="0" cy="1538626"/>
           </a:xfrm>
           <a:prstGeom prst="line">
@@ -4979,14 +4651,15 @@
           </p:cNvPr>
           <p:cNvCxnSpPr>
             <a:cxnSpLocks/>
+            <a:stCxn id="51" idx="6"/>
             <a:endCxn id="18" idx="1"/>
           </p:cNvCxnSpPr>
           <p:nvPr/>
         </p:nvCxnSpPr>
         <p:spPr>
           <a:xfrm>
-            <a:off x="6803647" y="2091430"/>
-            <a:ext cx="160665" cy="2"/>
+            <a:off x="6437622" y="1905920"/>
+            <a:ext cx="1225985" cy="14009"/>
           </a:xfrm>
           <a:prstGeom prst="line">
             <a:avLst/>
@@ -5029,9 +4702,9 @@
           <p:nvPr/>
         </p:nvCxnSpPr>
         <p:spPr>
-          <a:xfrm flipV="1">
-            <a:off x="8912149" y="2187241"/>
-            <a:ext cx="334221" cy="9700"/>
+          <a:xfrm>
+            <a:off x="9611444" y="2025437"/>
+            <a:ext cx="234603" cy="1038"/>
           </a:xfrm>
           <a:prstGeom prst="line">
             <a:avLst/>
@@ -5068,14 +4741,15 @@
           </p:cNvPr>
           <p:cNvCxnSpPr>
             <a:cxnSpLocks/>
+            <a:stCxn id="11" idx="3"/>
             <a:endCxn id="12" idx="1"/>
           </p:cNvCxnSpPr>
           <p:nvPr/>
         </p:nvCxnSpPr>
         <p:spPr>
           <a:xfrm flipV="1">
-            <a:off x="6502060" y="4546411"/>
-            <a:ext cx="706965" cy="8494"/>
+            <a:off x="6110469" y="4405061"/>
+            <a:ext cx="1545542" cy="1"/>
           </a:xfrm>
           <a:prstGeom prst="line">
             <a:avLst/>
@@ -5115,7 +4789,7 @@
         </p:nvSpPr>
         <p:spPr>
           <a:xfrm>
-            <a:off x="7255075" y="4274755"/>
+            <a:off x="7663606" y="4166153"/>
             <a:ext cx="1061398" cy="646331"/>
           </a:xfrm>
           <a:prstGeom prst="rect">
@@ -5166,8 +4840,8 @@
         </p:nvSpPr>
         <p:spPr>
           <a:xfrm>
-            <a:off x="838052" y="4438411"/>
-            <a:ext cx="1761887" cy="646331"/>
+            <a:off x="480116" y="4232109"/>
+            <a:ext cx="1642223" cy="646331"/>
           </a:xfrm>
           <a:prstGeom prst="rect">
             <a:avLst/>
@@ -5185,15 +4859,140 @@
           </a:bodyPr>
           <a:lstStyle/>
           <a:p>
+            <a:pPr algn="ctr"/>
             <a:r>
               <a:rPr lang="de-DE" dirty="0"/>
               <a:t>Output: </a:t>
             </a:r>
           </a:p>
           <a:p>
+            <a:pPr algn="ctr"/>
             <a:r>
               <a:rPr lang="de-DE" dirty="0"/>
               <a:t>3,6V/ 3000mAh</a:t>
+            </a:r>
+          </a:p>
+        </p:txBody>
+      </p:sp>
+      <p:sp>
+        <p:nvSpPr>
+          <p:cNvPr id="6" name="Rechteck 5">
+            <a:extLst>
+              <a:ext uri="{FF2B5EF4-FFF2-40B4-BE49-F238E27FC236}">
+                <a16:creationId xmlns:a16="http://schemas.microsoft.com/office/drawing/2014/main" id="{5B410893-5582-0845-A061-9F65C4AC9FFD}"/>
+              </a:ext>
+            </a:extLst>
+          </p:cNvPr>
+          <p:cNvSpPr/>
+          <p:nvPr/>
+        </p:nvSpPr>
+        <p:spPr>
+          <a:xfrm>
+            <a:off x="3066551" y="366380"/>
+            <a:ext cx="3402653" cy="3005492"/>
+          </a:xfrm>
+          <a:prstGeom prst="rect">
+            <a:avLst/>
+          </a:prstGeom>
+          <a:noFill/>
+          <a:ln w="19050">
+            <a:solidFill>
+              <a:schemeClr val="tx1"/>
+            </a:solidFill>
+            <a:prstDash val="dash"/>
+          </a:ln>
+        </p:spPr>
+        <p:style>
+          <a:lnRef idx="2">
+            <a:schemeClr val="accent1">
+              <a:shade val="50000"/>
+            </a:schemeClr>
+          </a:lnRef>
+          <a:fillRef idx="1">
+            <a:schemeClr val="accent1"/>
+          </a:fillRef>
+          <a:effectRef idx="0">
+            <a:schemeClr val="accent1"/>
+          </a:effectRef>
+          <a:fontRef idx="minor">
+            <a:schemeClr val="lt1"/>
+          </a:fontRef>
+        </p:style>
+        <p:txBody>
+          <a:bodyPr rtlCol="0" anchor="ctr"/>
+          <a:lstStyle/>
+          <a:p>
+            <a:pPr algn="ctr"/>
+            <a:endParaRPr lang="de-DE"/>
+          </a:p>
+        </p:txBody>
+      </p:sp>
+      <p:sp>
+        <p:nvSpPr>
+          <p:cNvPr id="28" name="Textfeld 27">
+            <a:extLst>
+              <a:ext uri="{FF2B5EF4-FFF2-40B4-BE49-F238E27FC236}">
+                <a16:creationId xmlns:a16="http://schemas.microsoft.com/office/drawing/2014/main" id="{92F477DC-F8FE-1047-8822-A8486BBAD278}"/>
+              </a:ext>
+            </a:extLst>
+          </p:cNvPr>
+          <p:cNvSpPr txBox="1"/>
+          <p:nvPr/>
+        </p:nvSpPr>
+        <p:spPr>
+          <a:xfrm>
+            <a:off x="4249293" y="89003"/>
+            <a:ext cx="1262653" cy="276999"/>
+          </a:xfrm>
+          <a:prstGeom prst="rect">
+            <a:avLst/>
+          </a:prstGeom>
+          <a:noFill/>
+        </p:spPr>
+        <p:txBody>
+          <a:bodyPr wrap="none" rtlCol="0">
+            <a:spAutoFit/>
+          </a:bodyPr>
+          <a:lstStyle/>
+          <a:p>
+            <a:r>
+              <a:rPr lang="de-DE" sz="1200" dirty="0"/>
+              <a:t>T1 in Reihe zu T2</a:t>
+            </a:r>
+          </a:p>
+        </p:txBody>
+      </p:sp>
+      <p:sp>
+        <p:nvSpPr>
+          <p:cNvPr id="35" name="Textfeld 34">
+            <a:extLst>
+              <a:ext uri="{FF2B5EF4-FFF2-40B4-BE49-F238E27FC236}">
+                <a16:creationId xmlns:a16="http://schemas.microsoft.com/office/drawing/2014/main" id="{B3A2715B-CCF7-754B-AC79-97CAF8C974F8}"/>
+              </a:ext>
+            </a:extLst>
+          </p:cNvPr>
+          <p:cNvSpPr txBox="1"/>
+          <p:nvPr/>
+        </p:nvSpPr>
+        <p:spPr>
+          <a:xfrm>
+            <a:off x="6492617" y="1980308"/>
+            <a:ext cx="1163395" cy="369332"/>
+          </a:xfrm>
+          <a:prstGeom prst="rect">
+            <a:avLst/>
+          </a:prstGeom>
+          <a:noFill/>
+        </p:spPr>
+        <p:txBody>
+          <a:bodyPr wrap="none" rtlCol="0">
+            <a:spAutoFit/>
+          </a:bodyPr>
+          <a:lstStyle/>
+          <a:p>
+            <a:r>
+              <a:rPr lang="de-DE" dirty="0"/>
+              <a:t>6,6V/ 1,2A</a:t>
             </a:r>
           </a:p>
         </p:txBody>
@@ -5287,23 +5086,6 @@
         <a:font script="Viet" typeface="Times New Roman"/>
         <a:font script="Uigh" typeface="Microsoft Uighur"/>
         <a:font script="Geor" typeface="Sylfaen"/>
-        <a:font script="Armn" typeface="Arial"/>
-        <a:font script="Bugi" typeface="Leelawadee UI"/>
-        <a:font script="Bopo" typeface="Microsoft JhengHei"/>
-        <a:font script="Java" typeface="Javanese Text"/>
-        <a:font script="Lisu" typeface="Segoe UI"/>
-        <a:font script="Mymr" typeface="Myanmar Text"/>
-        <a:font script="Nkoo" typeface="Ebrima"/>
-        <a:font script="Olck" typeface="Nirmala UI"/>
-        <a:font script="Osma" typeface="Ebrima"/>
-        <a:font script="Phag" typeface="Phagspa"/>
-        <a:font script="Syrn" typeface="Estrangelo Edessa"/>
-        <a:font script="Syrj" typeface="Estrangelo Edessa"/>
-        <a:font script="Syre" typeface="Estrangelo Edessa"/>
-        <a:font script="Sora" typeface="Nirmala UI"/>
-        <a:font script="Tale" typeface="Microsoft Tai Le"/>
-        <a:font script="Talu" typeface="Microsoft New Tai Lue"/>
-        <a:font script="Tfng" typeface="Ebrima"/>
       </a:majorFont>
       <a:minorFont>
         <a:latin typeface="Calibri" panose="020F0502020204030204"/>
@@ -5339,23 +5121,6 @@
         <a:font script="Viet" typeface="Arial"/>
         <a:font script="Uigh" typeface="Microsoft Uighur"/>
         <a:font script="Geor" typeface="Sylfaen"/>
-        <a:font script="Armn" typeface="Arial"/>
-        <a:font script="Bugi" typeface="Leelawadee UI"/>
-        <a:font script="Bopo" typeface="Microsoft JhengHei"/>
-        <a:font script="Java" typeface="Javanese Text"/>
-        <a:font script="Lisu" typeface="Segoe UI"/>
-        <a:font script="Mymr" typeface="Myanmar Text"/>
-        <a:font script="Nkoo" typeface="Ebrima"/>
-        <a:font script="Olck" typeface="Nirmala UI"/>
-        <a:font script="Osma" typeface="Ebrima"/>
-        <a:font script="Phag" typeface="Phagspa"/>
-        <a:font script="Syrn" typeface="Estrangelo Edessa"/>
-        <a:font script="Syrj" typeface="Estrangelo Edessa"/>
-        <a:font script="Syre" typeface="Estrangelo Edessa"/>
-        <a:font script="Sora" typeface="Nirmala UI"/>
-        <a:font script="Tale" typeface="Microsoft Tai Le"/>
-        <a:font script="Talu" typeface="Microsoft New Tai Lue"/>
-        <a:font script="Tfng" typeface="Ebrima"/>
       </a:minorFont>
     </a:fontScheme>
     <a:fmtScheme name="Office">

</xml_diff>